<commit_message>
add 2020 lecture 6
</commit_message>
<xml_diff>
--- a/course/compiler/lecture/(Spring2020)Lecture6.pptx
+++ b/course/compiler/lecture/(Spring2020)Lecture6.pptx
@@ -265,7 +265,7 @@
                 <a:ea typeface="微软雅黑" panose="020B0503020204020204" pitchFamily="34" charset="-122"/>
               </a:rPr>
               <a:pPr algn="r" rtl="0"/>
-              <a:t>2018/5/27</a:t>
+              <a:t>2020/5/4</a:t>
             </a:fld>
             <a:endParaRPr lang="zh-CN" altLang="en-US" dirty="0">
               <a:latin typeface="微软雅黑" panose="020B0503020204020204" pitchFamily="34" charset="-122"/>
@@ -452,7 +452,7 @@
             <a:fld id="{229B22C3-6CB1-491B-AD00-E0837F23A3F3}" type="datetime1">
               <a:rPr lang="zh-CN" altLang="en-US" smtClean="0"/>
               <a:pPr/>
-              <a:t>2018/5/27</a:t>
+              <a:t>2020/5/4</a:t>
             </a:fld>
             <a:endParaRPr lang="zh-CN" altLang="en-US" dirty="0"/>
           </a:p>
@@ -1048,7 +1048,7 @@
             <a:fld id="{A7392AAC-879E-4B39-8824-AF6B730A809E}" type="datetime1">
               <a:rPr lang="zh-CN" altLang="en-US" smtClean="0"/>
               <a:pPr/>
-              <a:t>2018/5/27</a:t>
+              <a:t>2020/5/4</a:t>
             </a:fld>
             <a:endParaRPr lang="zh-CN" altLang="en-US" dirty="0"/>
           </a:p>
@@ -1389,7 +1389,7 @@
             <a:fld id="{7118C275-B304-48F5-8C4F-015CBCF4E7C1}" type="datetime1">
               <a:rPr lang="zh-CN" altLang="en-US" smtClean="0"/>
               <a:pPr/>
-              <a:t>2018/5/27</a:t>
+              <a:t>2020/5/4</a:t>
             </a:fld>
             <a:r>
               <a:rPr lang="zh-CN" altLang="en-US" dirty="0"/>
@@ -1595,7 +1595,7 @@
             <a:fld id="{98791AA9-DDCB-4BA8-AD1D-963A3AA00622}" type="datetime1">
               <a:rPr lang="zh-CN" altLang="en-US" smtClean="0"/>
               <a:pPr/>
-              <a:t>2018/5/27</a:t>
+              <a:t>2020/5/4</a:t>
             </a:fld>
             <a:endParaRPr lang="zh-CN" altLang="en-US" dirty="0"/>
           </a:p>
@@ -1799,7 +1799,7 @@
             <a:fld id="{9170426F-E661-472B-BE42-25E072CD46D9}" type="datetime1">
               <a:rPr lang="zh-CN" altLang="en-US" smtClean="0"/>
               <a:pPr/>
-              <a:t>2018/5/27</a:t>
+              <a:t>2020/5/4</a:t>
             </a:fld>
             <a:endParaRPr lang="zh-CN" altLang="en-US" dirty="0"/>
           </a:p>
@@ -2121,7 +2121,7 @@
             <a:fld id="{9BA78444-6099-4C0A-A3A9-C6F3C5D7F289}" type="datetime1">
               <a:rPr lang="zh-CN" altLang="en-US" smtClean="0"/>
               <a:pPr/>
-              <a:t>2018/5/27</a:t>
+              <a:t>2020/5/4</a:t>
             </a:fld>
             <a:endParaRPr lang="zh-CN" altLang="en-US" dirty="0"/>
           </a:p>
@@ -3233,7 +3233,7 @@
             <a:fld id="{AF5F6A19-70BF-4380-9A40-68C9536408C6}" type="datetime1">
               <a:rPr lang="zh-CN" altLang="en-US" smtClean="0"/>
               <a:pPr/>
-              <a:t>2018/5/27</a:t>
+              <a:t>2020/5/4</a:t>
             </a:fld>
             <a:endParaRPr lang="zh-CN" altLang="en-US" dirty="0"/>
           </a:p>
@@ -3632,7 +3632,7 @@
             <a:fld id="{6017EB90-196C-4C15-BD31-13E0E0436C73}" type="datetime1">
               <a:rPr lang="zh-CN" altLang="en-US" smtClean="0"/>
               <a:pPr/>
-              <a:t>2018/5/27</a:t>
+              <a:t>2020/5/4</a:t>
             </a:fld>
             <a:r>
               <a:rPr lang="zh-CN" altLang="en-US" dirty="0"/>
@@ -4114,7 +4114,7 @@
             <a:fld id="{C2EC0F41-B48F-4298-A7F6-618EB9D22195}" type="datetime1">
               <a:rPr lang="zh-CN" altLang="en-US" smtClean="0"/>
               <a:pPr/>
-              <a:t>2018/5/27</a:t>
+              <a:t>2020/5/4</a:t>
             </a:fld>
             <a:endParaRPr lang="zh-CN" altLang="en-US" dirty="0"/>
           </a:p>
@@ -4265,7 +4265,7 @@
             <a:fld id="{7DB2D836-56E8-4B15-857C-14B1A5B3B67B}" type="datetime1">
               <a:rPr lang="zh-CN" altLang="en-US" smtClean="0"/>
               <a:pPr/>
-              <a:t>2018/5/27</a:t>
+              <a:t>2020/5/4</a:t>
             </a:fld>
             <a:endParaRPr lang="zh-CN" altLang="en-US" dirty="0"/>
           </a:p>
@@ -4383,7 +4383,7 @@
             <a:fld id="{038D929F-7D8C-4CC3-8AC7-BB9B8FE2DEBF}" type="datetime1">
               <a:rPr lang="zh-CN" altLang="en-US" smtClean="0"/>
               <a:pPr/>
-              <a:t>2018/5/27</a:t>
+              <a:t>2020/5/4</a:t>
             </a:fld>
             <a:endParaRPr lang="zh-CN" altLang="en-US" dirty="0"/>
           </a:p>
@@ -4686,7 +4686,7 @@
             <a:fld id="{F7892ACC-8BC8-4C9E-9D2B-0669DA5038B6}" type="datetime1">
               <a:rPr lang="zh-CN" altLang="en-US" smtClean="0"/>
               <a:pPr/>
-              <a:t>2018/5/27</a:t>
+              <a:t>2020/5/4</a:t>
             </a:fld>
             <a:endParaRPr lang="zh-CN" altLang="en-US" dirty="0"/>
           </a:p>
@@ -4952,7 +4952,7 @@
             <a:fld id="{660B6A15-7713-4A08-BBFD-F297CCC2B976}" type="datetime1">
               <a:rPr lang="zh-CN" altLang="en-US" smtClean="0"/>
               <a:pPr/>
-              <a:t>2018/5/27</a:t>
+              <a:t>2020/5/4</a:t>
             </a:fld>
             <a:r>
               <a:rPr lang="zh-CN" altLang="en-US" dirty="0"/>
@@ -6140,8 +6140,8 @@
         </p:nvSpPr>
         <p:spPr>
           <a:xfrm>
-            <a:off x="1001311" y="1936975"/>
-            <a:ext cx="1107996" cy="369332"/>
+            <a:off x="898762" y="1941754"/>
+            <a:ext cx="8071440" cy="646331"/>
           </a:xfrm>
           <a:prstGeom prst="rect">
             <a:avLst/>
@@ -6155,8 +6155,34 @@
           <a:lstStyle/>
           <a:p>
             <a:r>
-              <a:rPr lang="en-US" altLang="zh-CN" dirty="0"/>
-              <a:t>Top-down</a:t>
+              <a:rPr lang="en-US" altLang="zh-CN" dirty="0" smtClean="0"/>
+              <a:t>Top-down (</a:t>
+            </a:r>
+            <a:r>
+              <a:rPr lang="en-US" altLang="zh-CN" sz="1400" b="1" dirty="0" smtClean="0"/>
+              <a:t>Inherited attributes are useful when the structure of </a:t>
+            </a:r>
+            <a:r>
+              <a:rPr lang="en-US" altLang="zh-CN" sz="1400" b="1" dirty="0" smtClean="0"/>
+              <a:t>a parse tree does not</a:t>
+            </a:r>
+          </a:p>
+          <a:p>
+            <a:r>
+              <a:rPr lang="en-US" altLang="zh-CN" sz="1400" b="1" dirty="0"/>
+              <a:t> </a:t>
+            </a:r>
+            <a:r>
+              <a:rPr lang="en-US" altLang="zh-CN" sz="1400" b="1" dirty="0" smtClean="0"/>
+              <a:t>            “match” the abstract syntax of the source code</a:t>
+            </a:r>
+            <a:r>
+              <a:rPr lang="en-US" altLang="zh-CN" sz="1400" dirty="0" smtClean="0"/>
+              <a:t>.</a:t>
+            </a:r>
+            <a:r>
+              <a:rPr lang="en-US" altLang="zh-CN" dirty="0" smtClean="0"/>
+              <a:t>)</a:t>
             </a:r>
             <a:endParaRPr lang="zh-CN" altLang="en-US" dirty="0"/>
           </a:p>
@@ -6234,6 +6260,136 @@
           </a:prstGeom>
         </p:spPr>
       </p:pic>
+      <p:sp>
+        <p:nvSpPr>
+          <p:cNvPr id="4" name="文本框 3"/>
+          <p:cNvSpPr txBox="1"/>
+          <p:nvPr/>
+        </p:nvSpPr>
+        <p:spPr>
+          <a:xfrm>
+            <a:off x="552388" y="6172200"/>
+            <a:ext cx="8298169" cy="584775"/>
+          </a:xfrm>
+          <a:prstGeom prst="rect">
+            <a:avLst/>
+          </a:prstGeom>
+          <a:noFill/>
+        </p:spPr>
+        <p:txBody>
+          <a:bodyPr wrap="none" rtlCol="0">
+            <a:spAutoFit/>
+          </a:bodyPr>
+          <a:lstStyle/>
+          <a:p>
+            <a:r>
+              <a:rPr lang="en-US" altLang="zh-CN" sz="1600" dirty="0" smtClean="0">
+                <a:latin typeface="微软雅黑" panose="020B0503020204020204" pitchFamily="34" charset="-122"/>
+                <a:ea typeface="微软雅黑" panose="020B0503020204020204" pitchFamily="34" charset="-122"/>
+              </a:rPr>
+              <a:t>Given a term </a:t>
+            </a:r>
+            <a:r>
+              <a:rPr lang="en-US" altLang="zh-CN" sz="1600" i="1" dirty="0" smtClean="0">
+                <a:solidFill>
+                  <a:srgbClr val="00B050"/>
+                </a:solidFill>
+                <a:latin typeface="微软雅黑" panose="020B0503020204020204" pitchFamily="34" charset="-122"/>
+                <a:ea typeface="微软雅黑" panose="020B0503020204020204" pitchFamily="34" charset="-122"/>
+              </a:rPr>
+              <a:t>x*y*z</a:t>
+            </a:r>
+            <a:r>
+              <a:rPr lang="en-US" altLang="zh-CN" sz="1600" dirty="0" smtClean="0">
+                <a:latin typeface="微软雅黑" panose="020B0503020204020204" pitchFamily="34" charset="-122"/>
+                <a:ea typeface="微软雅黑" panose="020B0503020204020204" pitchFamily="34" charset="-122"/>
+              </a:rPr>
+              <a:t>, the root of the subtree for </a:t>
+            </a:r>
+            <a:r>
+              <a:rPr lang="en-US" altLang="zh-CN" sz="1600" i="1" dirty="0" smtClean="0">
+                <a:solidFill>
+                  <a:srgbClr val="00B050"/>
+                </a:solidFill>
+                <a:latin typeface="微软雅黑" panose="020B0503020204020204" pitchFamily="34" charset="-122"/>
+                <a:ea typeface="微软雅黑" panose="020B0503020204020204" pitchFamily="34" charset="-122"/>
+              </a:rPr>
+              <a:t>*y*z </a:t>
+            </a:r>
+            <a:r>
+              <a:rPr lang="en-US" altLang="zh-CN" sz="1600" dirty="0" smtClean="0">
+                <a:latin typeface="微软雅黑" panose="020B0503020204020204" pitchFamily="34" charset="-122"/>
+                <a:ea typeface="微软雅黑" panose="020B0503020204020204" pitchFamily="34" charset="-122"/>
+              </a:rPr>
+              <a:t>inherits </a:t>
+            </a:r>
+            <a:r>
+              <a:rPr lang="en-US" altLang="zh-CN" sz="1600" i="1" dirty="0" smtClean="0">
+                <a:solidFill>
+                  <a:srgbClr val="00B050"/>
+                </a:solidFill>
+                <a:latin typeface="微软雅黑" panose="020B0503020204020204" pitchFamily="34" charset="-122"/>
+                <a:ea typeface="微软雅黑" panose="020B0503020204020204" pitchFamily="34" charset="-122"/>
+              </a:rPr>
+              <a:t>x</a:t>
+            </a:r>
+            <a:r>
+              <a:rPr lang="en-US" altLang="zh-CN" sz="1600" dirty="0" smtClean="0">
+                <a:latin typeface="微软雅黑" panose="020B0503020204020204" pitchFamily="34" charset="-122"/>
+                <a:ea typeface="微软雅黑" panose="020B0503020204020204" pitchFamily="34" charset="-122"/>
+              </a:rPr>
+              <a:t>. Then, the root of the </a:t>
+            </a:r>
+          </a:p>
+          <a:p>
+            <a:r>
+              <a:rPr lang="en-US" altLang="zh-CN" sz="1600" dirty="0" smtClean="0">
+                <a:latin typeface="微软雅黑" panose="020B0503020204020204" pitchFamily="34" charset="-122"/>
+                <a:ea typeface="微软雅黑" panose="020B0503020204020204" pitchFamily="34" charset="-122"/>
+              </a:rPr>
+              <a:t>Subtree for </a:t>
+            </a:r>
+            <a:r>
+              <a:rPr lang="en-US" altLang="zh-CN" sz="1600" i="1" dirty="0" smtClean="0">
+                <a:solidFill>
+                  <a:srgbClr val="00B050"/>
+                </a:solidFill>
+                <a:latin typeface="微软雅黑" panose="020B0503020204020204" pitchFamily="34" charset="-122"/>
+                <a:ea typeface="微软雅黑" panose="020B0503020204020204" pitchFamily="34" charset="-122"/>
+              </a:rPr>
+              <a:t>*z</a:t>
+            </a:r>
+            <a:r>
+              <a:rPr lang="en-US" altLang="zh-CN" sz="1600" dirty="0" smtClean="0">
+                <a:latin typeface="微软雅黑" panose="020B0503020204020204" pitchFamily="34" charset="-122"/>
+                <a:ea typeface="微软雅黑" panose="020B0503020204020204" pitchFamily="34" charset="-122"/>
+              </a:rPr>
+              <a:t> inherits the value of </a:t>
+            </a:r>
+            <a:r>
+              <a:rPr lang="en-US" altLang="zh-CN" sz="1600" i="1" dirty="0" smtClean="0">
+                <a:solidFill>
+                  <a:srgbClr val="00B050"/>
+                </a:solidFill>
+                <a:latin typeface="微软雅黑" panose="020B0503020204020204" pitchFamily="34" charset="-122"/>
+                <a:ea typeface="微软雅黑" panose="020B0503020204020204" pitchFamily="34" charset="-122"/>
+              </a:rPr>
+              <a:t>x*y</a:t>
+            </a:r>
+            <a:r>
+              <a:rPr lang="en-US" altLang="zh-CN" sz="1600" dirty="0" smtClean="0">
+                <a:latin typeface="微软雅黑" panose="020B0503020204020204" pitchFamily="34" charset="-122"/>
+                <a:ea typeface="微软雅黑" panose="020B0503020204020204" pitchFamily="34" charset="-122"/>
+              </a:rPr>
+              <a:t>, and so on.</a:t>
+            </a:r>
+            <a:endParaRPr lang="zh-CN" altLang="en-US" sz="1600" dirty="0">
+              <a:latin typeface="微软雅黑" panose="020B0503020204020204" pitchFamily="34" charset="-122"/>
+              <a:ea typeface="微软雅黑" panose="020B0503020204020204" pitchFamily="34" charset="-122"/>
+            </a:endParaRPr>
+          </a:p>
+        </p:txBody>
+      </p:sp>
     </p:spTree>
     <p:extLst>
       <p:ext uri="{BB962C8B-B14F-4D97-AF65-F5344CB8AC3E}">
@@ -6322,11 +6478,7 @@
               </a:lnSpc>
             </a:pPr>
             <a:r>
-              <a:rPr lang="en-US" altLang="zh-CN" sz="1600" dirty="0"/>
-              <a:t>"</a:t>
-            </a:r>
-            <a:r>
-              <a:rPr lang="en-US" altLang="zh-CN" sz="1600" b="1" i="1" u="sng" dirty="0">
+              <a:rPr lang="en-US" altLang="zh-CN" sz="1600" b="1" i="1" u="sng" dirty="0" smtClean="0">
                 <a:solidFill>
                   <a:srgbClr val="7030A0"/>
                 </a:solidFill>
@@ -6334,8 +6486,12 @@
               <a:t>Dependency graphs</a:t>
             </a:r>
             <a:r>
+              <a:rPr lang="en-US" altLang="zh-CN" sz="1600" dirty="0" smtClean="0"/>
+              <a:t> </a:t>
+            </a:r>
+            <a:r>
               <a:rPr lang="en-US" altLang="zh-CN" sz="1600" dirty="0"/>
-              <a:t>" are a useful tool for determining an evaluation order for the attribute instances in a given parse tree. While an annotated parse tree shows the values of attributes, a dependency graph helps us determine how those values can be computed.</a:t>
+              <a:t>are a useful tool for determining an evaluation order for the attribute instances in a given parse tree. While an annotated parse tree shows the values of attributes, a dependency graph helps us determine how those values can be computed.</a:t>
             </a:r>
           </a:p>
           <a:p>
@@ -6535,7 +6691,7 @@
           <p:cNvPr id="5" name="图片 4">
             <a:extLst>
               <a:ext uri="{FF2B5EF4-FFF2-40B4-BE49-F238E27FC236}">
-                <a16:creationId xmlns:a16="http://schemas.microsoft.com/office/drawing/2014/main" id="{20D0D337-E1FD-49BC-80FD-49D298DC8B2C}"/>
+                <a16:creationId xmlns:a16="http://schemas.microsoft.com/office/drawing/2014/main" xmlns="" id="{20D0D337-E1FD-49BC-80FD-49D298DC8B2C}"/>
               </a:ext>
             </a:extLst>
           </p:cNvPr>
@@ -6640,7 +6796,12 @@
             <p:ph idx="1"/>
           </p:nvPr>
         </p:nvSpPr>
-        <p:spPr/>
+        <p:spPr>
+          <a:xfrm>
+            <a:off x="828675" y="1600200"/>
+            <a:ext cx="7486650" cy="3980204"/>
+          </a:xfrm>
+        </p:spPr>
         <p:txBody>
           <a:bodyPr>
             <a:normAutofit/>
@@ -6670,7 +6831,23 @@
                   <a:schemeClr val="tx2"/>
                 </a:solidFill>
               </a:rPr>
-              <a:t>When an .SDD is S-attributed, we can evaluate its attributes in any bottom up order of the nodes of the parse tree. It is often especially simple to evaluate the attributes by performing a </a:t>
+              <a:t>When an </a:t>
+            </a:r>
+            <a:r>
+              <a:rPr lang="en-US" altLang="zh-CN" sz="1900" b="1" dirty="0" smtClean="0">
+                <a:solidFill>
+                  <a:schemeClr val="tx2"/>
+                </a:solidFill>
+              </a:rPr>
+              <a:t>SDD </a:t>
+            </a:r>
+            <a:r>
+              <a:rPr lang="en-US" altLang="zh-CN" sz="1900" b="1" dirty="0">
+                <a:solidFill>
+                  <a:schemeClr val="tx2"/>
+                </a:solidFill>
+              </a:rPr>
+              <a:t>is S-attributed, we can evaluate its attributes in any bottom up order of the nodes of the parse tree. It is often especially simple to evaluate the attributes by performing a </a:t>
             </a:r>
             <a:r>
               <a:rPr lang="en-US" altLang="zh-CN" sz="1900" b="1" dirty="0" err="1">
@@ -6752,6 +6929,243 @@
           </a:prstGeom>
         </p:spPr>
       </p:pic>
+      <p:sp>
+        <p:nvSpPr>
+          <p:cNvPr id="5" name="内容占位符 2"/>
+          <p:cNvSpPr txBox="1">
+            <a:spLocks/>
+          </p:cNvSpPr>
+          <p:nvPr/>
+        </p:nvSpPr>
+        <p:spPr>
+          <a:xfrm>
+            <a:off x="579842" y="5580404"/>
+            <a:ext cx="7983178" cy="863124"/>
+          </a:xfrm>
+          <a:prstGeom prst="rect">
+            <a:avLst/>
+          </a:prstGeom>
+        </p:spPr>
+        <p:style>
+          <a:lnRef idx="1">
+            <a:schemeClr val="accent6"/>
+          </a:lnRef>
+          <a:fillRef idx="2">
+            <a:schemeClr val="accent6"/>
+          </a:fillRef>
+          <a:effectRef idx="1">
+            <a:schemeClr val="accent6"/>
+          </a:effectRef>
+          <a:fontRef idx="minor">
+            <a:schemeClr val="dk1"/>
+          </a:fontRef>
+        </p:style>
+        <p:txBody>
+          <a:bodyPr vert="horz" lIns="0" tIns="45720" rIns="0" bIns="45720" rtlCol="0">
+            <a:normAutofit fontScale="92500"/>
+          </a:bodyPr>
+          <a:lstStyle>
+            <a:lvl1pPr marL="171450" indent="-171450" algn="l" defTabSz="685800" rtl="0" eaLnBrk="1" latinLnBrk="0" hangingPunct="1">
+              <a:lnSpc>
+                <a:spcPct val="90000"/>
+              </a:lnSpc>
+              <a:spcBef>
+                <a:spcPts val="1350"/>
+              </a:spcBef>
+              <a:buFont typeface="Wingdings" panose="05000000000000000000" pitchFamily="2" charset="2"/>
+              <a:buChar char="§"/>
+              <a:defRPr sz="1500" kern="1200">
+                <a:solidFill>
+                  <a:schemeClr val="tx1"/>
+                </a:solidFill>
+                <a:latin typeface="微软雅黑" panose="020B0503020204020204" pitchFamily="34" charset="-122"/>
+                <a:ea typeface="微软雅黑" panose="020B0503020204020204" pitchFamily="34" charset="-122"/>
+                <a:cs typeface="+mn-cs"/>
+              </a:defRPr>
+            </a:lvl1pPr>
+            <a:lvl2pPr marL="514350" indent="-171450" algn="l" defTabSz="685800" rtl="0" eaLnBrk="1" latinLnBrk="0" hangingPunct="1">
+              <a:lnSpc>
+                <a:spcPct val="90000"/>
+              </a:lnSpc>
+              <a:spcBef>
+                <a:spcPts val="450"/>
+              </a:spcBef>
+              <a:buFont typeface="Wingdings" panose="05000000000000000000" pitchFamily="2" charset="2"/>
+              <a:buChar char="§"/>
+              <a:defRPr sz="1200" kern="1200">
+                <a:solidFill>
+                  <a:schemeClr val="tx1"/>
+                </a:solidFill>
+                <a:latin typeface="微软雅黑" panose="020B0503020204020204" pitchFamily="34" charset="-122"/>
+                <a:ea typeface="微软雅黑" panose="020B0503020204020204" pitchFamily="34" charset="-122"/>
+                <a:cs typeface="+mn-cs"/>
+              </a:defRPr>
+            </a:lvl2pPr>
+            <a:lvl3pPr marL="857250" indent="-171450" algn="l" defTabSz="685800" rtl="0" eaLnBrk="1" latinLnBrk="0" hangingPunct="1">
+              <a:lnSpc>
+                <a:spcPct val="90000"/>
+              </a:lnSpc>
+              <a:spcBef>
+                <a:spcPts val="450"/>
+              </a:spcBef>
+              <a:buFont typeface="Wingdings" panose="05000000000000000000" pitchFamily="2" charset="2"/>
+              <a:buChar char="§"/>
+              <a:defRPr sz="1050" kern="1200">
+                <a:solidFill>
+                  <a:schemeClr val="tx1"/>
+                </a:solidFill>
+                <a:latin typeface="微软雅黑" panose="020B0503020204020204" pitchFamily="34" charset="-122"/>
+                <a:ea typeface="微软雅黑" panose="020B0503020204020204" pitchFamily="34" charset="-122"/>
+                <a:cs typeface="+mn-cs"/>
+              </a:defRPr>
+            </a:lvl3pPr>
+            <a:lvl4pPr marL="1200150" indent="-171450" algn="l" defTabSz="685800" rtl="0" eaLnBrk="1" latinLnBrk="0" hangingPunct="1">
+              <a:lnSpc>
+                <a:spcPct val="90000"/>
+              </a:lnSpc>
+              <a:spcBef>
+                <a:spcPts val="450"/>
+              </a:spcBef>
+              <a:buFont typeface="Wingdings" panose="05000000000000000000" pitchFamily="2" charset="2"/>
+              <a:buChar char="§"/>
+              <a:defRPr sz="1050" kern="1200">
+                <a:solidFill>
+                  <a:schemeClr val="tx1"/>
+                </a:solidFill>
+                <a:latin typeface="微软雅黑" panose="020B0503020204020204" pitchFamily="34" charset="-122"/>
+                <a:ea typeface="微软雅黑" panose="020B0503020204020204" pitchFamily="34" charset="-122"/>
+                <a:cs typeface="+mn-cs"/>
+              </a:defRPr>
+            </a:lvl4pPr>
+            <a:lvl5pPr marL="1543050" indent="-171450" algn="l" defTabSz="685800" rtl="0" eaLnBrk="1" latinLnBrk="0" hangingPunct="1">
+              <a:lnSpc>
+                <a:spcPct val="90000"/>
+              </a:lnSpc>
+              <a:spcBef>
+                <a:spcPts val="450"/>
+              </a:spcBef>
+              <a:buFont typeface="Wingdings" panose="05000000000000000000" pitchFamily="2" charset="2"/>
+              <a:buChar char="§"/>
+              <a:defRPr sz="1050" kern="1200">
+                <a:solidFill>
+                  <a:schemeClr val="tx1"/>
+                </a:solidFill>
+                <a:latin typeface="微软雅黑" panose="020B0503020204020204" pitchFamily="34" charset="-122"/>
+                <a:ea typeface="微软雅黑" panose="020B0503020204020204" pitchFamily="34" charset="-122"/>
+                <a:cs typeface="+mn-cs"/>
+              </a:defRPr>
+            </a:lvl5pPr>
+            <a:lvl6pPr marL="1885950" indent="-171450" algn="l" defTabSz="685800" rtl="0" eaLnBrk="1" latinLnBrk="0" hangingPunct="1">
+              <a:lnSpc>
+                <a:spcPct val="90000"/>
+              </a:lnSpc>
+              <a:spcBef>
+                <a:spcPts val="375"/>
+              </a:spcBef>
+              <a:buFont typeface="Wingdings" panose="05000000000000000000" pitchFamily="2" charset="2"/>
+              <a:buChar char="§"/>
+              <a:defRPr sz="1050" kern="1200">
+                <a:solidFill>
+                  <a:schemeClr val="tx1"/>
+                </a:solidFill>
+                <a:latin typeface="微软雅黑" panose="020B0503020204020204" pitchFamily="34" charset="-122"/>
+                <a:ea typeface="微软雅黑" panose="020B0503020204020204" pitchFamily="34" charset="-122"/>
+                <a:cs typeface="+mn-cs"/>
+              </a:defRPr>
+            </a:lvl6pPr>
+            <a:lvl7pPr marL="2228850" indent="-171450" algn="l" defTabSz="685800" rtl="0" eaLnBrk="1" latinLnBrk="0" hangingPunct="1">
+              <a:lnSpc>
+                <a:spcPct val="90000"/>
+              </a:lnSpc>
+              <a:spcBef>
+                <a:spcPts val="375"/>
+              </a:spcBef>
+              <a:buFont typeface="Wingdings" panose="05000000000000000000" pitchFamily="2" charset="2"/>
+              <a:buChar char="§"/>
+              <a:defRPr sz="1050" kern="1200">
+                <a:solidFill>
+                  <a:schemeClr val="tx1"/>
+                </a:solidFill>
+                <a:latin typeface="微软雅黑" panose="020B0503020204020204" pitchFamily="34" charset="-122"/>
+                <a:ea typeface="微软雅黑" panose="020B0503020204020204" pitchFamily="34" charset="-122"/>
+                <a:cs typeface="+mn-cs"/>
+              </a:defRPr>
+            </a:lvl7pPr>
+            <a:lvl8pPr marL="2571750" indent="-171450" algn="l" defTabSz="685800" rtl="0" eaLnBrk="1" latinLnBrk="0" hangingPunct="1">
+              <a:lnSpc>
+                <a:spcPct val="90000"/>
+              </a:lnSpc>
+              <a:spcBef>
+                <a:spcPts val="375"/>
+              </a:spcBef>
+              <a:buFont typeface="Wingdings" panose="05000000000000000000" pitchFamily="2" charset="2"/>
+              <a:buChar char="§"/>
+              <a:defRPr sz="1050" kern="1200">
+                <a:solidFill>
+                  <a:schemeClr val="tx1"/>
+                </a:solidFill>
+                <a:latin typeface="微软雅黑" panose="020B0503020204020204" pitchFamily="34" charset="-122"/>
+                <a:ea typeface="微软雅黑" panose="020B0503020204020204" pitchFamily="34" charset="-122"/>
+                <a:cs typeface="+mn-cs"/>
+              </a:defRPr>
+            </a:lvl8pPr>
+            <a:lvl9pPr marL="2914650" indent="-171450" algn="l" defTabSz="685800" rtl="0" eaLnBrk="1" latinLnBrk="0" hangingPunct="1">
+              <a:lnSpc>
+                <a:spcPct val="90000"/>
+              </a:lnSpc>
+              <a:spcBef>
+                <a:spcPts val="375"/>
+              </a:spcBef>
+              <a:buFont typeface="Wingdings" panose="05000000000000000000" pitchFamily="2" charset="2"/>
+              <a:buChar char="§"/>
+              <a:defRPr sz="1050" kern="1200">
+                <a:solidFill>
+                  <a:schemeClr val="tx1"/>
+                </a:solidFill>
+                <a:latin typeface="微软雅黑" panose="020B0503020204020204" pitchFamily="34" charset="-122"/>
+                <a:ea typeface="微软雅黑" panose="020B0503020204020204" pitchFamily="34" charset="-122"/>
+                <a:cs typeface="+mn-cs"/>
+              </a:defRPr>
+            </a:lvl9pPr>
+          </a:lstStyle>
+          <a:p>
+            <a:pPr>
+              <a:lnSpc>
+                <a:spcPct val="110000"/>
+              </a:lnSpc>
+            </a:pPr>
+            <a:r>
+              <a:rPr lang="en-US" altLang="zh-CN" sz="1900" dirty="0" smtClean="0">
+                <a:solidFill>
+                  <a:schemeClr val="tx2"/>
+                </a:solidFill>
+              </a:rPr>
+              <a:t>S-attributed definitions can be implemented during bottom-up parsing, since a bottom up parse corresponds to a </a:t>
+            </a:r>
+            <a:r>
+              <a:rPr lang="en-US" altLang="zh-CN" sz="1900" dirty="0" err="1" smtClean="0">
+                <a:solidFill>
+                  <a:schemeClr val="tx2"/>
+                </a:solidFill>
+              </a:rPr>
+              <a:t>postorder</a:t>
+            </a:r>
+            <a:r>
+              <a:rPr lang="en-US" altLang="zh-CN" sz="1900" dirty="0" smtClean="0">
+                <a:solidFill>
+                  <a:schemeClr val="tx2"/>
+                </a:solidFill>
+              </a:rPr>
+              <a:t> traversal.</a:t>
+            </a:r>
+            <a:endParaRPr lang="zh-CN" altLang="en-US" sz="1900" dirty="0">
+              <a:solidFill>
+                <a:schemeClr val="tx2"/>
+              </a:solidFill>
+            </a:endParaRPr>
+          </a:p>
+        </p:txBody>
+      </p:sp>
     </p:spTree>
     <p:extLst>
       <p:ext uri="{BB962C8B-B14F-4D97-AF65-F5344CB8AC3E}">
@@ -7226,7 +7640,7 @@
           <p:cNvPr id="4" name="图片 3">
             <a:extLst>
               <a:ext uri="{FF2B5EF4-FFF2-40B4-BE49-F238E27FC236}">
-                <a16:creationId xmlns:a16="http://schemas.microsoft.com/office/drawing/2014/main" id="{D5D0ADB2-4D41-4031-9869-9F1942359865}"/>
+                <a16:creationId xmlns:a16="http://schemas.microsoft.com/office/drawing/2014/main" xmlns="" id="{D5D0ADB2-4D41-4031-9869-9F1942359865}"/>
               </a:ext>
             </a:extLst>
           </p:cNvPr>
@@ -7997,6 +8411,9 @@
           </a:p>
           <a:p>
             <a:pPr marL="0" indent="0">
+              <a:lnSpc>
+                <a:spcPct val="110000"/>
+              </a:lnSpc>
               <a:buNone/>
             </a:pPr>
             <a:r>
@@ -8196,7 +8613,7 @@
           <p:cNvPr id="5" name="图片 4">
             <a:extLst>
               <a:ext uri="{FF2B5EF4-FFF2-40B4-BE49-F238E27FC236}">
-                <a16:creationId xmlns:a16="http://schemas.microsoft.com/office/drawing/2014/main" id="{DB9ECCF3-D88F-4129-8C70-7ACF05D730C1}"/>
+                <a16:creationId xmlns:a16="http://schemas.microsoft.com/office/drawing/2014/main" xmlns="" id="{DB9ECCF3-D88F-4129-8C70-7ACF05D730C1}"/>
               </a:ext>
             </a:extLst>
           </p:cNvPr>
@@ -8268,7 +8685,7 @@
           <p:cNvPr id="2" name="标题 1">
             <a:extLst>
               <a:ext uri="{FF2B5EF4-FFF2-40B4-BE49-F238E27FC236}">
-                <a16:creationId xmlns:a16="http://schemas.microsoft.com/office/drawing/2014/main" id="{ED2205E1-7F18-4A7D-80F7-3E308B6826EC}"/>
+                <a16:creationId xmlns:a16="http://schemas.microsoft.com/office/drawing/2014/main" xmlns="" id="{ED2205E1-7F18-4A7D-80F7-3E308B6826EC}"/>
               </a:ext>
             </a:extLst>
           </p:cNvPr>
@@ -8297,7 +8714,7 @@
           <p:cNvPr id="5" name="图片 4">
             <a:extLst>
               <a:ext uri="{FF2B5EF4-FFF2-40B4-BE49-F238E27FC236}">
-                <a16:creationId xmlns:a16="http://schemas.microsoft.com/office/drawing/2014/main" id="{CB22EE56-0091-4EAF-9632-C0FC6F5B4F29}"/>
+                <a16:creationId xmlns:a16="http://schemas.microsoft.com/office/drawing/2014/main" xmlns="" id="{CB22EE56-0091-4EAF-9632-C0FC6F5B4F29}"/>
               </a:ext>
             </a:extLst>
           </p:cNvPr>
@@ -8369,7 +8786,7 @@
           <p:cNvPr id="2" name="标题 1">
             <a:extLst>
               <a:ext uri="{FF2B5EF4-FFF2-40B4-BE49-F238E27FC236}">
-                <a16:creationId xmlns:a16="http://schemas.microsoft.com/office/drawing/2014/main" id="{06D3FC8F-BF33-4907-B218-721029C3D885}"/>
+                <a16:creationId xmlns:a16="http://schemas.microsoft.com/office/drawing/2014/main" xmlns="" id="{06D3FC8F-BF33-4907-B218-721029C3D885}"/>
               </a:ext>
             </a:extLst>
           </p:cNvPr>
@@ -8398,7 +8815,7 @@
           <p:cNvPr id="3" name="内容占位符 2">
             <a:extLst>
               <a:ext uri="{FF2B5EF4-FFF2-40B4-BE49-F238E27FC236}">
-                <a16:creationId xmlns:a16="http://schemas.microsoft.com/office/drawing/2014/main" id="{14C50C73-3213-4060-953A-C9EE48B41786}"/>
+                <a16:creationId xmlns:a16="http://schemas.microsoft.com/office/drawing/2014/main" xmlns="" id="{14C50C73-3213-4060-953A-C9EE48B41786}"/>
               </a:ext>
             </a:extLst>
           </p:cNvPr>
@@ -8494,7 +8911,7 @@
           <p:cNvPr id="2" name="标题 1">
             <a:extLst>
               <a:ext uri="{FF2B5EF4-FFF2-40B4-BE49-F238E27FC236}">
-                <a16:creationId xmlns:a16="http://schemas.microsoft.com/office/drawing/2014/main" id="{44769F36-3310-4F2E-A61A-76B8E1EDD4E6}"/>
+                <a16:creationId xmlns:a16="http://schemas.microsoft.com/office/drawing/2014/main" xmlns="" id="{44769F36-3310-4F2E-A61A-76B8E1EDD4E6}"/>
               </a:ext>
             </a:extLst>
           </p:cNvPr>
@@ -8523,7 +8940,7 @@
           <p:cNvPr id="4" name="图片 3">
             <a:extLst>
               <a:ext uri="{FF2B5EF4-FFF2-40B4-BE49-F238E27FC236}">
-                <a16:creationId xmlns:a16="http://schemas.microsoft.com/office/drawing/2014/main" id="{4D266839-5B9B-4692-9B06-BC24B1CFC75D}"/>
+                <a16:creationId xmlns:a16="http://schemas.microsoft.com/office/drawing/2014/main" xmlns="" id="{4D266839-5B9B-4692-9B06-BC24B1CFC75D}"/>
               </a:ext>
             </a:extLst>
           </p:cNvPr>
@@ -8658,9 +9075,19 @@
             </a:r>
           </a:p>
           <a:p>
-            <a:endParaRPr lang="en-US" altLang="zh-CN" dirty="0"/>
-          </a:p>
-          <a:p>
+            <a:r>
+              <a:rPr lang="en-US" altLang="zh-CN" dirty="0" smtClean="0"/>
+              <a:t>Implementing </a:t>
+            </a:r>
+            <a:r>
+              <a:rPr lang="en-US" altLang="zh-CN" dirty="0"/>
+              <a:t>L-Attributed SDD 's</a:t>
+            </a:r>
+          </a:p>
+          <a:p>
+            <a:pPr marL="0" indent="0">
+              <a:buNone/>
+            </a:pPr>
             <a:endParaRPr lang="en-US" altLang="zh-CN" dirty="0"/>
           </a:p>
           <a:p>
@@ -8730,7 +9157,7 @@
           <p:cNvPr id="2" name="标题 1">
             <a:extLst>
               <a:ext uri="{FF2B5EF4-FFF2-40B4-BE49-F238E27FC236}">
-                <a16:creationId xmlns:a16="http://schemas.microsoft.com/office/drawing/2014/main" id="{0C42D67D-46CF-4046-977E-9A4CBC3B9DC3}"/>
+                <a16:creationId xmlns:a16="http://schemas.microsoft.com/office/drawing/2014/main" xmlns="" id="{0C42D67D-46CF-4046-977E-9A4CBC3B9DC3}"/>
               </a:ext>
             </a:extLst>
           </p:cNvPr>
@@ -8759,7 +9186,7 @@
           <p:cNvPr id="3" name="内容占位符 2">
             <a:extLst>
               <a:ext uri="{FF2B5EF4-FFF2-40B4-BE49-F238E27FC236}">
-                <a16:creationId xmlns:a16="http://schemas.microsoft.com/office/drawing/2014/main" id="{E64B9F9C-FC1C-4E07-8392-1E4E94959F8E}"/>
+                <a16:creationId xmlns:a16="http://schemas.microsoft.com/office/drawing/2014/main" xmlns="" id="{E64B9F9C-FC1C-4E07-8392-1E4E94959F8E}"/>
               </a:ext>
             </a:extLst>
           </p:cNvPr>
@@ -8807,7 +9234,7 @@
           <p:cNvPr id="5" name="图片 4">
             <a:extLst>
               <a:ext uri="{FF2B5EF4-FFF2-40B4-BE49-F238E27FC236}">
-                <a16:creationId xmlns:a16="http://schemas.microsoft.com/office/drawing/2014/main" id="{C545A1B0-3864-4DC1-B1C0-6B9092DB15ED}"/>
+                <a16:creationId xmlns:a16="http://schemas.microsoft.com/office/drawing/2014/main" xmlns="" id="{C545A1B0-3864-4DC1-B1C0-6B9092DB15ED}"/>
               </a:ext>
             </a:extLst>
           </p:cNvPr>
@@ -8885,7 +9312,7 @@
           <p:cNvPr id="2" name="标题 1">
             <a:extLst>
               <a:ext uri="{FF2B5EF4-FFF2-40B4-BE49-F238E27FC236}">
-                <a16:creationId xmlns:a16="http://schemas.microsoft.com/office/drawing/2014/main" id="{DE0AA93C-15DA-419F-B9B1-EED7854DE606}"/>
+                <a16:creationId xmlns:a16="http://schemas.microsoft.com/office/drawing/2014/main" xmlns="" id="{DE0AA93C-15DA-419F-B9B1-EED7854DE606}"/>
               </a:ext>
             </a:extLst>
           </p:cNvPr>
@@ -8914,7 +9341,7 @@
           <p:cNvPr id="3" name="内容占位符 2">
             <a:extLst>
               <a:ext uri="{FF2B5EF4-FFF2-40B4-BE49-F238E27FC236}">
-                <a16:creationId xmlns:a16="http://schemas.microsoft.com/office/drawing/2014/main" id="{5F3FD113-9D12-4C39-BCF5-27D9CA2216CF}"/>
+                <a16:creationId xmlns:a16="http://schemas.microsoft.com/office/drawing/2014/main" xmlns="" id="{5F3FD113-9D12-4C39-BCF5-27D9CA2216CF}"/>
               </a:ext>
             </a:extLst>
           </p:cNvPr>
@@ -8962,7 +9389,7 @@
           <p:cNvPr id="4" name="图片 3">
             <a:extLst>
               <a:ext uri="{FF2B5EF4-FFF2-40B4-BE49-F238E27FC236}">
-                <a16:creationId xmlns:a16="http://schemas.microsoft.com/office/drawing/2014/main" id="{CD136149-8F2D-41F3-A731-12B4EA6036F0}"/>
+                <a16:creationId xmlns:a16="http://schemas.microsoft.com/office/drawing/2014/main" xmlns="" id="{CD136149-8F2D-41F3-A731-12B4EA6036F0}"/>
               </a:ext>
             </a:extLst>
           </p:cNvPr>
@@ -9034,7 +9461,7 @@
           <p:cNvPr id="2" name="标题 1">
             <a:extLst>
               <a:ext uri="{FF2B5EF4-FFF2-40B4-BE49-F238E27FC236}">
-                <a16:creationId xmlns:a16="http://schemas.microsoft.com/office/drawing/2014/main" id="{561DF9F1-55AA-4CE9-9FAA-5F2B1649D445}"/>
+                <a16:creationId xmlns:a16="http://schemas.microsoft.com/office/drawing/2014/main" xmlns="" id="{561DF9F1-55AA-4CE9-9FAA-5F2B1649D445}"/>
               </a:ext>
             </a:extLst>
           </p:cNvPr>
@@ -9063,7 +9490,7 @@
           <p:cNvPr id="4" name="图片 3">
             <a:extLst>
               <a:ext uri="{FF2B5EF4-FFF2-40B4-BE49-F238E27FC236}">
-                <a16:creationId xmlns:a16="http://schemas.microsoft.com/office/drawing/2014/main" id="{8E58542B-8D82-4D44-9392-DC000903D4AC}"/>
+                <a16:creationId xmlns:a16="http://schemas.microsoft.com/office/drawing/2014/main" xmlns="" id="{8E58542B-8D82-4D44-9392-DC000903D4AC}"/>
               </a:ext>
             </a:extLst>
           </p:cNvPr>
@@ -9135,7 +9562,7 @@
           <p:cNvPr id="2" name="标题 1">
             <a:extLst>
               <a:ext uri="{FF2B5EF4-FFF2-40B4-BE49-F238E27FC236}">
-                <a16:creationId xmlns:a16="http://schemas.microsoft.com/office/drawing/2014/main" id="{375A8377-C778-4659-BEA4-72A986A03FF8}"/>
+                <a16:creationId xmlns:a16="http://schemas.microsoft.com/office/drawing/2014/main" xmlns="" id="{375A8377-C778-4659-BEA4-72A986A03FF8}"/>
               </a:ext>
             </a:extLst>
           </p:cNvPr>
@@ -9164,7 +9591,7 @@
           <p:cNvPr id="3" name="内容占位符 2">
             <a:extLst>
               <a:ext uri="{FF2B5EF4-FFF2-40B4-BE49-F238E27FC236}">
-                <a16:creationId xmlns:a16="http://schemas.microsoft.com/office/drawing/2014/main" id="{A3EEE31D-629D-4206-89E4-7F5BD29502F1}"/>
+                <a16:creationId xmlns:a16="http://schemas.microsoft.com/office/drawing/2014/main" xmlns="" id="{A3EEE31D-629D-4206-89E4-7F5BD29502F1}"/>
               </a:ext>
             </a:extLst>
           </p:cNvPr>
@@ -9203,7 +9630,7 @@
           <p:cNvPr id="4" name="图片 3">
             <a:extLst>
               <a:ext uri="{FF2B5EF4-FFF2-40B4-BE49-F238E27FC236}">
-                <a16:creationId xmlns:a16="http://schemas.microsoft.com/office/drawing/2014/main" id="{262405F0-4C28-4A33-BDD8-1E08919120EA}"/>
+                <a16:creationId xmlns:a16="http://schemas.microsoft.com/office/drawing/2014/main" xmlns="" id="{262405F0-4C28-4A33-BDD8-1E08919120EA}"/>
               </a:ext>
             </a:extLst>
           </p:cNvPr>
@@ -9233,7 +9660,7 @@
           <p:cNvPr id="6" name="矩形 5">
             <a:extLst>
               <a:ext uri="{FF2B5EF4-FFF2-40B4-BE49-F238E27FC236}">
-                <a16:creationId xmlns:a16="http://schemas.microsoft.com/office/drawing/2014/main" id="{D45CB778-5CE4-4C46-A509-5927758BB42A}"/>
+                <a16:creationId xmlns:a16="http://schemas.microsoft.com/office/drawing/2014/main" xmlns="" id="{D45CB778-5CE4-4C46-A509-5927758BB42A}"/>
               </a:ext>
             </a:extLst>
           </p:cNvPr>
@@ -9322,7 +9749,7 @@
           <p:cNvPr id="2" name="标题 1">
             <a:extLst>
               <a:ext uri="{FF2B5EF4-FFF2-40B4-BE49-F238E27FC236}">
-                <a16:creationId xmlns:a16="http://schemas.microsoft.com/office/drawing/2014/main" id="{ABEECC54-2579-4F1D-8237-52FFDDCC8C67}"/>
+                <a16:creationId xmlns:a16="http://schemas.microsoft.com/office/drawing/2014/main" xmlns="" id="{ABEECC54-2579-4F1D-8237-52FFDDCC8C67}"/>
               </a:ext>
             </a:extLst>
           </p:cNvPr>
@@ -9351,7 +9778,7 @@
           <p:cNvPr id="4" name="图片 3">
             <a:extLst>
               <a:ext uri="{FF2B5EF4-FFF2-40B4-BE49-F238E27FC236}">
-                <a16:creationId xmlns:a16="http://schemas.microsoft.com/office/drawing/2014/main" id="{58807CEE-4B9B-474C-A5BE-9AEBD0252054}"/>
+                <a16:creationId xmlns:a16="http://schemas.microsoft.com/office/drawing/2014/main" xmlns="" id="{58807CEE-4B9B-474C-A5BE-9AEBD0252054}"/>
               </a:ext>
             </a:extLst>
           </p:cNvPr>
@@ -9381,7 +9808,7 @@
           <p:cNvPr id="3" name="图片 2">
             <a:extLst>
               <a:ext uri="{FF2B5EF4-FFF2-40B4-BE49-F238E27FC236}">
-                <a16:creationId xmlns:a16="http://schemas.microsoft.com/office/drawing/2014/main" id="{30DFE33C-B979-446F-8AD3-551E8B38A089}"/>
+                <a16:creationId xmlns:a16="http://schemas.microsoft.com/office/drawing/2014/main" xmlns="" id="{30DFE33C-B979-446F-8AD3-551E8B38A089}"/>
               </a:ext>
             </a:extLst>
           </p:cNvPr>
@@ -9453,7 +9880,7 @@
           <p:cNvPr id="2" name="标题 1">
             <a:extLst>
               <a:ext uri="{FF2B5EF4-FFF2-40B4-BE49-F238E27FC236}">
-                <a16:creationId xmlns:a16="http://schemas.microsoft.com/office/drawing/2014/main" id="{5CC67A61-E529-41A8-829A-BE702D34341E}"/>
+                <a16:creationId xmlns:a16="http://schemas.microsoft.com/office/drawing/2014/main" xmlns="" id="{5CC67A61-E529-41A8-829A-BE702D34341E}"/>
               </a:ext>
             </a:extLst>
           </p:cNvPr>
@@ -9482,7 +9909,7 @@
           <p:cNvPr id="4" name="图片 3">
             <a:extLst>
               <a:ext uri="{FF2B5EF4-FFF2-40B4-BE49-F238E27FC236}">
-                <a16:creationId xmlns:a16="http://schemas.microsoft.com/office/drawing/2014/main" id="{80FFBADB-FF94-41DA-8E84-6C2D2A18297B}"/>
+                <a16:creationId xmlns:a16="http://schemas.microsoft.com/office/drawing/2014/main" xmlns="" id="{80FFBADB-FF94-41DA-8E84-6C2D2A18297B}"/>
               </a:ext>
             </a:extLst>
           </p:cNvPr>
@@ -9512,7 +9939,7 @@
           <p:cNvPr id="3" name="图片 2">
             <a:extLst>
               <a:ext uri="{FF2B5EF4-FFF2-40B4-BE49-F238E27FC236}">
-                <a16:creationId xmlns:a16="http://schemas.microsoft.com/office/drawing/2014/main" id="{6FBD328B-3116-4236-9F8F-64F052BE11BC}"/>
+                <a16:creationId xmlns:a16="http://schemas.microsoft.com/office/drawing/2014/main" xmlns="" id="{6FBD328B-3116-4236-9F8F-64F052BE11BC}"/>
               </a:ext>
             </a:extLst>
           </p:cNvPr>
@@ -9584,7 +10011,7 @@
           <p:cNvPr id="2" name="标题 1">
             <a:extLst>
               <a:ext uri="{FF2B5EF4-FFF2-40B4-BE49-F238E27FC236}">
-                <a16:creationId xmlns:a16="http://schemas.microsoft.com/office/drawing/2014/main" id="{B360E440-5FC0-460F-8AB1-C40DE1DAB558}"/>
+                <a16:creationId xmlns:a16="http://schemas.microsoft.com/office/drawing/2014/main" xmlns="" id="{B360E440-5FC0-460F-8AB1-C40DE1DAB558}"/>
               </a:ext>
             </a:extLst>
           </p:cNvPr>
@@ -9613,7 +10040,7 @@
           <p:cNvPr id="4" name="图片 3">
             <a:extLst>
               <a:ext uri="{FF2B5EF4-FFF2-40B4-BE49-F238E27FC236}">
-                <a16:creationId xmlns:a16="http://schemas.microsoft.com/office/drawing/2014/main" id="{AEFD2626-5361-4F63-B263-5D64DE42885A}"/>
+                <a16:creationId xmlns:a16="http://schemas.microsoft.com/office/drawing/2014/main" xmlns="" id="{AEFD2626-5361-4F63-B263-5D64DE42885A}"/>
               </a:ext>
             </a:extLst>
           </p:cNvPr>
@@ -9643,7 +10070,7 @@
           <p:cNvPr id="5" name="图片 4">
             <a:extLst>
               <a:ext uri="{FF2B5EF4-FFF2-40B4-BE49-F238E27FC236}">
-                <a16:creationId xmlns:a16="http://schemas.microsoft.com/office/drawing/2014/main" id="{C4F97E0D-41C5-4086-B22D-6B2AE58B92AF}"/>
+                <a16:creationId xmlns:a16="http://schemas.microsoft.com/office/drawing/2014/main" xmlns="" id="{C4F97E0D-41C5-4086-B22D-6B2AE58B92AF}"/>
               </a:ext>
             </a:extLst>
           </p:cNvPr>
@@ -9673,7 +10100,7 @@
           <p:cNvPr id="6" name="箭头: 右 5">
             <a:extLst>
               <a:ext uri="{FF2B5EF4-FFF2-40B4-BE49-F238E27FC236}">
-                <a16:creationId xmlns:a16="http://schemas.microsoft.com/office/drawing/2014/main" id="{1EBA6DF8-D0ED-45A6-8FE0-E178504F7A23}"/>
+                <a16:creationId xmlns:a16="http://schemas.microsoft.com/office/drawing/2014/main" xmlns="" id="{1EBA6DF8-D0ED-45A6-8FE0-E178504F7A23}"/>
               </a:ext>
             </a:extLst>
           </p:cNvPr>
@@ -9719,7 +10146,7 @@
           <p:cNvPr id="7" name="图片 6">
             <a:extLst>
               <a:ext uri="{FF2B5EF4-FFF2-40B4-BE49-F238E27FC236}">
-                <a16:creationId xmlns:a16="http://schemas.microsoft.com/office/drawing/2014/main" id="{8DFBAA59-5C4D-4A82-ADA2-FAECD58F989A}"/>
+                <a16:creationId xmlns:a16="http://schemas.microsoft.com/office/drawing/2014/main" xmlns="" id="{8DFBAA59-5C4D-4A82-ADA2-FAECD58F989A}"/>
               </a:ext>
             </a:extLst>
           </p:cNvPr>
@@ -9791,7 +10218,7 @@
           <p:cNvPr id="2" name="标题 1">
             <a:extLst>
               <a:ext uri="{FF2B5EF4-FFF2-40B4-BE49-F238E27FC236}">
-                <a16:creationId xmlns:a16="http://schemas.microsoft.com/office/drawing/2014/main" id="{925036EB-DEE2-406D-9F14-44EEFE1EC6C6}"/>
+                <a16:creationId xmlns:a16="http://schemas.microsoft.com/office/drawing/2014/main" xmlns="" id="{925036EB-DEE2-406D-9F14-44EEFE1EC6C6}"/>
               </a:ext>
             </a:extLst>
           </p:cNvPr>
@@ -9820,7 +10247,7 @@
           <p:cNvPr id="3" name="内容占位符 2">
             <a:extLst>
               <a:ext uri="{FF2B5EF4-FFF2-40B4-BE49-F238E27FC236}">
-                <a16:creationId xmlns:a16="http://schemas.microsoft.com/office/drawing/2014/main" id="{00AE49C5-625F-4BD7-A9B4-C6047E019503}"/>
+                <a16:creationId xmlns:a16="http://schemas.microsoft.com/office/drawing/2014/main" xmlns="" id="{00AE49C5-625F-4BD7-A9B4-C6047E019503}"/>
               </a:ext>
             </a:extLst>
           </p:cNvPr>
@@ -9861,7 +10288,7 @@
           <p:cNvPr id="4" name="图片 3">
             <a:extLst>
               <a:ext uri="{FF2B5EF4-FFF2-40B4-BE49-F238E27FC236}">
-                <a16:creationId xmlns:a16="http://schemas.microsoft.com/office/drawing/2014/main" id="{9A2FD4A4-7C2D-4FDD-947D-30F715E480B2}"/>
+                <a16:creationId xmlns:a16="http://schemas.microsoft.com/office/drawing/2014/main" xmlns="" id="{9A2FD4A4-7C2D-4FDD-947D-30F715E480B2}"/>
               </a:ext>
             </a:extLst>
           </p:cNvPr>
@@ -9891,7 +10318,7 @@
           <p:cNvPr id="5" name="图片 4">
             <a:extLst>
               <a:ext uri="{FF2B5EF4-FFF2-40B4-BE49-F238E27FC236}">
-                <a16:creationId xmlns:a16="http://schemas.microsoft.com/office/drawing/2014/main" id="{966B30D7-C591-47FD-A5A3-62270D7BE02D}"/>
+                <a16:creationId xmlns:a16="http://schemas.microsoft.com/office/drawing/2014/main" xmlns="" id="{966B30D7-C591-47FD-A5A3-62270D7BE02D}"/>
               </a:ext>
             </a:extLst>
           </p:cNvPr>
@@ -9963,7 +10390,7 @@
           <p:cNvPr id="2" name="标题 1">
             <a:extLst>
               <a:ext uri="{FF2B5EF4-FFF2-40B4-BE49-F238E27FC236}">
-                <a16:creationId xmlns:a16="http://schemas.microsoft.com/office/drawing/2014/main" id="{B3616FFA-97A1-432F-A572-9D4A9851BF1C}"/>
+                <a16:creationId xmlns:a16="http://schemas.microsoft.com/office/drawing/2014/main" xmlns="" id="{B3616FFA-97A1-432F-A572-9D4A9851BF1C}"/>
               </a:ext>
             </a:extLst>
           </p:cNvPr>
@@ -9992,7 +10419,7 @@
           <p:cNvPr id="4" name="图片 3">
             <a:extLst>
               <a:ext uri="{FF2B5EF4-FFF2-40B4-BE49-F238E27FC236}">
-                <a16:creationId xmlns:a16="http://schemas.microsoft.com/office/drawing/2014/main" id="{9BDBFCFF-B4CC-4975-A9E7-916425078DF2}"/>
+                <a16:creationId xmlns:a16="http://schemas.microsoft.com/office/drawing/2014/main" xmlns="" id="{9BDBFCFF-B4CC-4975-A9E7-916425078DF2}"/>
               </a:ext>
             </a:extLst>
           </p:cNvPr>
@@ -10022,7 +10449,7 @@
           <p:cNvPr id="5" name="图片 4">
             <a:extLst>
               <a:ext uri="{FF2B5EF4-FFF2-40B4-BE49-F238E27FC236}">
-                <a16:creationId xmlns:a16="http://schemas.microsoft.com/office/drawing/2014/main" id="{542CBEA2-FC66-468B-BD17-38067158F767}"/>
+                <a16:creationId xmlns:a16="http://schemas.microsoft.com/office/drawing/2014/main" xmlns="" id="{542CBEA2-FC66-468B-BD17-38067158F767}"/>
               </a:ext>
             </a:extLst>
           </p:cNvPr>
@@ -10052,7 +10479,7 @@
           <p:cNvPr id="6" name="箭头: 下 5">
             <a:extLst>
               <a:ext uri="{FF2B5EF4-FFF2-40B4-BE49-F238E27FC236}">
-                <a16:creationId xmlns:a16="http://schemas.microsoft.com/office/drawing/2014/main" id="{532FFDFA-E3F2-4F69-918C-330B329B480D}"/>
+                <a16:creationId xmlns:a16="http://schemas.microsoft.com/office/drawing/2014/main" xmlns="" id="{532FFDFA-E3F2-4F69-918C-330B329B480D}"/>
               </a:ext>
             </a:extLst>
           </p:cNvPr>
@@ -10140,7 +10567,7 @@
           <p:cNvPr id="2" name="标题 1">
             <a:extLst>
               <a:ext uri="{FF2B5EF4-FFF2-40B4-BE49-F238E27FC236}">
-                <a16:creationId xmlns:a16="http://schemas.microsoft.com/office/drawing/2014/main" id="{047BF5E4-3F60-428E-A941-15D669C0BD11}"/>
+                <a16:creationId xmlns:a16="http://schemas.microsoft.com/office/drawing/2014/main" xmlns="" id="{047BF5E4-3F60-428E-A941-15D669C0BD11}"/>
               </a:ext>
             </a:extLst>
           </p:cNvPr>
@@ -10169,7 +10596,7 @@
           <p:cNvPr id="3" name="内容占位符 2">
             <a:extLst>
               <a:ext uri="{FF2B5EF4-FFF2-40B4-BE49-F238E27FC236}">
-                <a16:creationId xmlns:a16="http://schemas.microsoft.com/office/drawing/2014/main" id="{CD8A2E96-23E2-4C98-BECA-C852F1B25A77}"/>
+                <a16:creationId xmlns:a16="http://schemas.microsoft.com/office/drawing/2014/main" xmlns="" id="{CD8A2E96-23E2-4C98-BECA-C852F1B25A77}"/>
               </a:ext>
             </a:extLst>
           </p:cNvPr>
@@ -10375,7 +10802,19 @@
             </a:pPr>
             <a:r>
               <a:rPr lang="en-US" altLang="zh-CN" sz="1800" dirty="0"/>
-              <a:t>A syntax-directed definition specifies the values of attributes by associating </a:t>
+              <a:t>A </a:t>
+            </a:r>
+            <a:r>
+              <a:rPr lang="en-US" altLang="zh-CN" sz="1800" dirty="0">
+                <a:solidFill>
+                  <a:srgbClr val="7030A0"/>
+                </a:solidFill>
+              </a:rPr>
+              <a:t>syntax-directed definition </a:t>
+            </a:r>
+            <a:r>
+              <a:rPr lang="en-US" altLang="zh-CN" sz="1800" dirty="0"/>
+              <a:t>specifies the values of attributes by associating </a:t>
             </a:r>
             <a:r>
               <a:rPr lang="en-US" altLang="zh-CN" sz="1800" b="1" dirty="0"/>
@@ -10394,7 +10833,7 @@
           <p:cNvPr id="6" name="图片 5">
             <a:extLst>
               <a:ext uri="{FF2B5EF4-FFF2-40B4-BE49-F238E27FC236}">
-                <a16:creationId xmlns:a16="http://schemas.microsoft.com/office/drawing/2014/main" id="{7C82A730-939B-4182-B617-CE5367D1FA16}"/>
+                <a16:creationId xmlns:a16="http://schemas.microsoft.com/office/drawing/2014/main" xmlns="" id="{7C82A730-939B-4182-B617-CE5367D1FA16}"/>
               </a:ext>
             </a:extLst>
           </p:cNvPr>
@@ -10424,7 +10863,7 @@
           <p:cNvPr id="7" name="矩形 6">
             <a:extLst>
               <a:ext uri="{FF2B5EF4-FFF2-40B4-BE49-F238E27FC236}">
-                <a16:creationId xmlns:a16="http://schemas.microsoft.com/office/drawing/2014/main" id="{225F7DE6-80B3-4B12-AF4E-4BFB981B7694}"/>
+                <a16:creationId xmlns:a16="http://schemas.microsoft.com/office/drawing/2014/main" xmlns="" id="{225F7DE6-80B3-4B12-AF4E-4BFB981B7694}"/>
               </a:ext>
             </a:extLst>
           </p:cNvPr>
@@ -10433,7 +10872,7 @@
         </p:nvSpPr>
         <p:spPr>
           <a:xfrm>
-            <a:off x="1681374" y="4703815"/>
+            <a:off x="1566907" y="4690351"/>
             <a:ext cx="3281244" cy="369332"/>
           </a:xfrm>
           <a:prstGeom prst="rect">
@@ -10459,7 +10898,7 @@
           <p:cNvPr id="8" name="矩形 7">
             <a:extLst>
               <a:ext uri="{FF2B5EF4-FFF2-40B4-BE49-F238E27FC236}">
-                <a16:creationId xmlns:a16="http://schemas.microsoft.com/office/drawing/2014/main" id="{8CD4E63D-BCA8-466C-A68C-308C2F92ADBE}"/>
+                <a16:creationId xmlns:a16="http://schemas.microsoft.com/office/drawing/2014/main" xmlns="" id="{8CD4E63D-BCA8-466C-A68C-308C2F92ADBE}"/>
               </a:ext>
             </a:extLst>
           </p:cNvPr>
@@ -10468,8 +10907,8 @@
         </p:nvSpPr>
         <p:spPr>
           <a:xfrm>
-            <a:off x="4962618" y="4703815"/>
-            <a:ext cx="4345620" cy="923330"/>
+            <a:off x="4474346" y="4707443"/>
+            <a:ext cx="4345620" cy="1200329"/>
           </a:xfrm>
           <a:prstGeom prst="rect">
             <a:avLst/>
@@ -10483,7 +10922,15 @@
           <a:p>
             <a:r>
               <a:rPr lang="en-US" altLang="zh-CN" dirty="0"/>
-              <a:t>subscript in E</a:t>
+              <a:t>S</a:t>
+            </a:r>
+            <a:r>
+              <a:rPr lang="en-US" altLang="zh-CN" dirty="0" smtClean="0"/>
+              <a:t>ubscript </a:t>
+            </a:r>
+            <a:r>
+              <a:rPr lang="en-US" altLang="zh-CN" dirty="0"/>
+              <a:t>in E</a:t>
             </a:r>
             <a:r>
               <a:rPr lang="en-US" altLang="zh-CN" baseline="-25000" dirty="0"/>
@@ -10491,7 +10938,11 @@
             </a:r>
             <a:r>
               <a:rPr lang="en-US" altLang="zh-CN" dirty="0"/>
-              <a:t> distinguishes the occurrence of E in the production body from the occurrence of E as the head</a:t>
+              <a:t> distinguishes the occurrence of E in the production body from the occurrence of E as the </a:t>
+            </a:r>
+            <a:r>
+              <a:rPr lang="en-US" altLang="zh-CN" dirty="0" smtClean="0"/>
+              <a:t>head.</a:t>
             </a:r>
             <a:endParaRPr lang="zh-CN" altLang="en-US" dirty="0"/>
           </a:p>
@@ -10502,7 +10953,7 @@
           <p:cNvPr id="10" name="直接箭头连接符 9">
             <a:extLst>
               <a:ext uri="{FF2B5EF4-FFF2-40B4-BE49-F238E27FC236}">
-                <a16:creationId xmlns:a16="http://schemas.microsoft.com/office/drawing/2014/main" id="{2A0BE18E-BFD3-485C-AB52-987C9F69FDA5}"/>
+                <a16:creationId xmlns:a16="http://schemas.microsoft.com/office/drawing/2014/main" xmlns="" id="{2A0BE18E-BFD3-485C-AB52-987C9F69FDA5}"/>
               </a:ext>
             </a:extLst>
           </p:cNvPr>
@@ -10586,7 +11037,7 @@
           <p:cNvPr id="2" name="标题 1">
             <a:extLst>
               <a:ext uri="{FF2B5EF4-FFF2-40B4-BE49-F238E27FC236}">
-                <a16:creationId xmlns:a16="http://schemas.microsoft.com/office/drawing/2014/main" id="{815A092C-0A40-4C08-A19C-F13AD08D9639}"/>
+                <a16:creationId xmlns:a16="http://schemas.microsoft.com/office/drawing/2014/main" xmlns="" id="{815A092C-0A40-4C08-A19C-F13AD08D9639}"/>
               </a:ext>
             </a:extLst>
           </p:cNvPr>
@@ -10615,7 +11066,7 @@
           <p:cNvPr id="4" name="图片 3">
             <a:extLst>
               <a:ext uri="{FF2B5EF4-FFF2-40B4-BE49-F238E27FC236}">
-                <a16:creationId xmlns:a16="http://schemas.microsoft.com/office/drawing/2014/main" id="{33F48C0D-3CBC-474F-B252-639229700A9E}"/>
+                <a16:creationId xmlns:a16="http://schemas.microsoft.com/office/drawing/2014/main" xmlns="" id="{33F48C0D-3CBC-474F-B252-639229700A9E}"/>
               </a:ext>
             </a:extLst>
           </p:cNvPr>
@@ -10645,7 +11096,7 @@
           <p:cNvPr id="5" name="图片 4">
             <a:extLst>
               <a:ext uri="{FF2B5EF4-FFF2-40B4-BE49-F238E27FC236}">
-                <a16:creationId xmlns:a16="http://schemas.microsoft.com/office/drawing/2014/main" id="{DC91E67A-D2D1-48CD-BC32-E8E470E5D15E}"/>
+                <a16:creationId xmlns:a16="http://schemas.microsoft.com/office/drawing/2014/main" xmlns="" id="{DC91E67A-D2D1-48CD-BC32-E8E470E5D15E}"/>
               </a:ext>
             </a:extLst>
           </p:cNvPr>
@@ -10675,7 +11126,7 @@
           <p:cNvPr id="6" name="图片 5">
             <a:extLst>
               <a:ext uri="{FF2B5EF4-FFF2-40B4-BE49-F238E27FC236}">
-                <a16:creationId xmlns:a16="http://schemas.microsoft.com/office/drawing/2014/main" id="{C17D4DB8-6D7F-449C-B632-C04A663FB834}"/>
+                <a16:creationId xmlns:a16="http://schemas.microsoft.com/office/drawing/2014/main" xmlns="" id="{C17D4DB8-6D7F-449C-B632-C04A663FB834}"/>
               </a:ext>
             </a:extLst>
           </p:cNvPr>
@@ -10747,7 +11198,7 @@
           <p:cNvPr id="2" name="标题 1">
             <a:extLst>
               <a:ext uri="{FF2B5EF4-FFF2-40B4-BE49-F238E27FC236}">
-                <a16:creationId xmlns:a16="http://schemas.microsoft.com/office/drawing/2014/main" id="{53C26A74-3A65-4644-88A4-A95713C01160}"/>
+                <a16:creationId xmlns:a16="http://schemas.microsoft.com/office/drawing/2014/main" xmlns="" id="{53C26A74-3A65-4644-88A4-A95713C01160}"/>
               </a:ext>
             </a:extLst>
           </p:cNvPr>
@@ -10776,7 +11227,7 @@
           <p:cNvPr id="4" name="内容占位符 3">
             <a:extLst>
               <a:ext uri="{FF2B5EF4-FFF2-40B4-BE49-F238E27FC236}">
-                <a16:creationId xmlns:a16="http://schemas.microsoft.com/office/drawing/2014/main" id="{C1F7CC53-031B-48DB-8A99-35007BA2330E}"/>
+                <a16:creationId xmlns:a16="http://schemas.microsoft.com/office/drawing/2014/main" xmlns="" id="{C1F7CC53-031B-48DB-8A99-35007BA2330E}"/>
               </a:ext>
             </a:extLst>
           </p:cNvPr>
@@ -10808,7 +11259,7 @@
           <p:cNvPr id="5" name="图片 4">
             <a:extLst>
               <a:ext uri="{FF2B5EF4-FFF2-40B4-BE49-F238E27FC236}">
-                <a16:creationId xmlns:a16="http://schemas.microsoft.com/office/drawing/2014/main" id="{9E89FBA2-8533-4DEE-9641-9ED90D0BB78D}"/>
+                <a16:creationId xmlns:a16="http://schemas.microsoft.com/office/drawing/2014/main" xmlns="" id="{9E89FBA2-8533-4DEE-9641-9ED90D0BB78D}"/>
               </a:ext>
             </a:extLst>
           </p:cNvPr>
@@ -10880,7 +11331,7 @@
           <p:cNvPr id="2" name="标题 1">
             <a:extLst>
               <a:ext uri="{FF2B5EF4-FFF2-40B4-BE49-F238E27FC236}">
-                <a16:creationId xmlns:a16="http://schemas.microsoft.com/office/drawing/2014/main" id="{5C0CC61F-24CA-41A3-B586-F882C43E4D56}"/>
+                <a16:creationId xmlns:a16="http://schemas.microsoft.com/office/drawing/2014/main" xmlns="" id="{5C0CC61F-24CA-41A3-B586-F882C43E4D56}"/>
               </a:ext>
             </a:extLst>
           </p:cNvPr>
@@ -10909,7 +11360,7 @@
           <p:cNvPr id="4" name="图片 3">
             <a:extLst>
               <a:ext uri="{FF2B5EF4-FFF2-40B4-BE49-F238E27FC236}">
-                <a16:creationId xmlns:a16="http://schemas.microsoft.com/office/drawing/2014/main" id="{5F6FC81A-75BB-4A52-BEE7-CE2FA036E7AB}"/>
+                <a16:creationId xmlns:a16="http://schemas.microsoft.com/office/drawing/2014/main" xmlns="" id="{5F6FC81A-75BB-4A52-BEE7-CE2FA036E7AB}"/>
               </a:ext>
             </a:extLst>
           </p:cNvPr>
@@ -11150,7 +11601,7 @@
           <a:graphicData uri="http://schemas.openxmlformats.org/presentationml/2006/ole">
             <mc:AlternateContent xmlns:mc="http://schemas.openxmlformats.org/markup-compatibility/2006">
               <mc:Choice xmlns:v="urn:schemas-microsoft-com:vml" Requires="v">
-                <p:oleObj spid="_x0000_s1059" name="Equation" r:id="rId3" imgW="774360" imgH="431640" progId="Equation.DSMT4">
+                <p:oleObj spid="_x0000_s1094" name="Equation" r:id="rId3" imgW="774360" imgH="431640" progId="Equation.DSMT4">
                   <p:embed/>
                 </p:oleObj>
               </mc:Choice>
@@ -11236,7 +11687,7 @@
           <p:cNvPr id="2" name="标题 1">
             <a:extLst>
               <a:ext uri="{FF2B5EF4-FFF2-40B4-BE49-F238E27FC236}">
-                <a16:creationId xmlns:a16="http://schemas.microsoft.com/office/drawing/2014/main" id="{24F4F8E7-4DA6-4043-A142-FFD00000D364}"/>
+                <a16:creationId xmlns:a16="http://schemas.microsoft.com/office/drawing/2014/main" xmlns="" id="{24F4F8E7-4DA6-4043-A142-FFD00000D364}"/>
               </a:ext>
             </a:extLst>
           </p:cNvPr>
@@ -11265,7 +11716,7 @@
           <p:cNvPr id="3" name="内容占位符 2">
             <a:extLst>
               <a:ext uri="{FF2B5EF4-FFF2-40B4-BE49-F238E27FC236}">
-                <a16:creationId xmlns:a16="http://schemas.microsoft.com/office/drawing/2014/main" id="{EDE2676F-59AB-4DD6-B234-479EC08E73DD}"/>
+                <a16:creationId xmlns:a16="http://schemas.microsoft.com/office/drawing/2014/main" xmlns="" id="{EDE2676F-59AB-4DD6-B234-479EC08E73DD}"/>
               </a:ext>
             </a:extLst>
           </p:cNvPr>
@@ -11306,7 +11757,7 @@
           <p:cNvPr id="5" name="矩形 4">
             <a:extLst>
               <a:ext uri="{FF2B5EF4-FFF2-40B4-BE49-F238E27FC236}">
-                <a16:creationId xmlns:a16="http://schemas.microsoft.com/office/drawing/2014/main" id="{39DE9480-8F05-44FA-97B1-FF50EF5D73D0}"/>
+                <a16:creationId xmlns:a16="http://schemas.microsoft.com/office/drawing/2014/main" xmlns="" id="{39DE9480-8F05-44FA-97B1-FF50EF5D73D0}"/>
               </a:ext>
             </a:extLst>
           </p:cNvPr>
@@ -11315,8 +11766,8 @@
         </p:nvSpPr>
         <p:spPr>
           <a:xfrm>
-            <a:off x="1060881" y="3108094"/>
-            <a:ext cx="7044432" cy="1200329"/>
+            <a:off x="1060881" y="3023248"/>
+            <a:ext cx="7044432" cy="1477328"/>
           </a:xfrm>
           <a:prstGeom prst="rect">
             <a:avLst/>
@@ -11333,45 +11784,50 @@
                 <a:solidFill>
                   <a:srgbClr val="7030A0"/>
                 </a:solidFill>
-                <a:latin typeface="Fd2399443-Identity-H"/>
+                <a:latin typeface="微软雅黑" panose="020B0503020204020204" pitchFamily="34" charset="-122"/>
+                <a:ea typeface="微软雅黑" panose="020B0503020204020204" pitchFamily="34" charset="-122"/>
               </a:rPr>
               <a:t>The position of a semantic action </a:t>
             </a:r>
             <a:r>
               <a:rPr lang="en-US" altLang="zh-CN" dirty="0">
-                <a:latin typeface="Fd2399443-Identity-H"/>
+                <a:latin typeface="微软雅黑" panose="020B0503020204020204" pitchFamily="34" charset="-122"/>
+                <a:ea typeface="微软雅黑" panose="020B0503020204020204" pitchFamily="34" charset="-122"/>
               </a:rPr>
-              <a:t>in a production body determines</a:t>
-            </a:r>
-          </a:p>
-          <a:p>
+              <a:t>in a production body </a:t>
+            </a:r>
+            <a:r>
+              <a:rPr lang="en-US" altLang="zh-CN" dirty="0" smtClean="0">
+                <a:latin typeface="微软雅黑" panose="020B0503020204020204" pitchFamily="34" charset="-122"/>
+                <a:ea typeface="微软雅黑" panose="020B0503020204020204" pitchFamily="34" charset="-122"/>
+              </a:rPr>
+              <a:t>determines the </a:t>
+            </a:r>
             <a:r>
               <a:rPr lang="en-US" altLang="zh-CN" dirty="0">
-                <a:latin typeface="Fd2399443-Identity-H"/>
+                <a:latin typeface="微软雅黑" panose="020B0503020204020204" pitchFamily="34" charset="-122"/>
+                <a:ea typeface="微软雅黑" panose="020B0503020204020204" pitchFamily="34" charset="-122"/>
               </a:rPr>
-              <a:t>the order in which the action is executed. In production </a:t>
+              <a:t>order in which the action is executed. In production (5. 2) , the </a:t>
+            </a:r>
+            <a:r>
+              <a:rPr lang="en-US" altLang="zh-CN" dirty="0" smtClean="0">
+                <a:latin typeface="微软雅黑" panose="020B0503020204020204" pitchFamily="34" charset="-122"/>
+                <a:ea typeface="微软雅黑" panose="020B0503020204020204" pitchFamily="34" charset="-122"/>
+              </a:rPr>
+              <a:t>action occurs </a:t>
             </a:r>
             <a:r>
               <a:rPr lang="en-US" altLang="zh-CN" dirty="0">
-                <a:latin typeface="Fd439111-Identity-H"/>
+                <a:latin typeface="微软雅黑" panose="020B0503020204020204" pitchFamily="34" charset="-122"/>
+                <a:ea typeface="微软雅黑" panose="020B0503020204020204" pitchFamily="34" charset="-122"/>
               </a:rPr>
-              <a:t>(5. 2) , </a:t>
-            </a:r>
-            <a:r>
-              <a:rPr lang="en-US" altLang="zh-CN" dirty="0">
-                <a:latin typeface="Fd2399443-Identity-H"/>
-              </a:rPr>
-              <a:t>the action</a:t>
-            </a:r>
-          </a:p>
-          <a:p>
-            <a:r>
-              <a:rPr lang="en-US" altLang="zh-CN" dirty="0">
-                <a:latin typeface="Fd2399443-Identity-H"/>
-              </a:rPr>
-              <a:t>occurs at the end , after all the grammar symbols; in general, semantic actions may occur at any position in a production body.</a:t>
-            </a:r>
-            <a:endParaRPr lang="zh-CN" altLang="en-US" dirty="0"/>
+              <a:t>at the end , after all the grammar symbols; in general, semantic actions may occur at any position in a production body.</a:t>
+            </a:r>
+            <a:endParaRPr lang="zh-CN" altLang="en-US" dirty="0">
+              <a:latin typeface="微软雅黑" panose="020B0503020204020204" pitchFamily="34" charset="-122"/>
+              <a:ea typeface="微软雅黑" panose="020B0503020204020204" pitchFamily="34" charset="-122"/>
+            </a:endParaRPr>
           </a:p>
         </p:txBody>
       </p:sp>
@@ -11380,7 +11836,7 @@
           <p:cNvPr id="7" name="图片 6">
             <a:extLst>
               <a:ext uri="{FF2B5EF4-FFF2-40B4-BE49-F238E27FC236}">
-                <a16:creationId xmlns:a16="http://schemas.microsoft.com/office/drawing/2014/main" id="{C9A7BF75-F594-43DA-AFC2-34EA0782CA66}"/>
+                <a16:creationId xmlns:a16="http://schemas.microsoft.com/office/drawing/2014/main" xmlns="" id="{C9A7BF75-F594-43DA-AFC2-34EA0782CA66}"/>
               </a:ext>
             </a:extLst>
           </p:cNvPr>
@@ -11410,7 +11866,7 @@
           <p:cNvPr id="8" name="矩形 7">
             <a:extLst>
               <a:ext uri="{FF2B5EF4-FFF2-40B4-BE49-F238E27FC236}">
-                <a16:creationId xmlns:a16="http://schemas.microsoft.com/office/drawing/2014/main" id="{24BFA8EF-A4B5-47C1-955D-97DA2A957F17}"/>
+                <a16:creationId xmlns:a16="http://schemas.microsoft.com/office/drawing/2014/main" xmlns="" id="{24BFA8EF-A4B5-47C1-955D-97DA2A957F17}"/>
               </a:ext>
             </a:extLst>
           </p:cNvPr>
@@ -11433,7 +11889,10 @@
           <a:lstStyle/>
           <a:p>
             <a:r>
-              <a:rPr lang="en-US" altLang="zh-CN" dirty="0"/>
+              <a:rPr lang="en-US" altLang="zh-CN" dirty="0">
+                <a:latin typeface="微软雅黑" panose="020B0503020204020204" pitchFamily="34" charset="-122"/>
+                <a:ea typeface="微软雅黑" panose="020B0503020204020204" pitchFamily="34" charset="-122"/>
+              </a:rPr>
               <a:t>Between the two notations, </a:t>
             </a:r>
             <a:r>
@@ -11441,11 +11900,16 @@
                 <a:solidFill>
                   <a:srgbClr val="7030A0"/>
                 </a:solidFill>
+                <a:latin typeface="微软雅黑" panose="020B0503020204020204" pitchFamily="34" charset="-122"/>
+                <a:ea typeface="微软雅黑" panose="020B0503020204020204" pitchFamily="34" charset="-122"/>
               </a:rPr>
               <a:t>syntax-directed definitions </a:t>
             </a:r>
             <a:r>
-              <a:rPr lang="en-US" altLang="zh-CN" dirty="0"/>
+              <a:rPr lang="en-US" altLang="zh-CN" dirty="0">
+                <a:latin typeface="微软雅黑" panose="020B0503020204020204" pitchFamily="34" charset="-122"/>
+                <a:ea typeface="微软雅黑" panose="020B0503020204020204" pitchFamily="34" charset="-122"/>
+              </a:rPr>
               <a:t>can be more readable, and hence more useful for specifications. However, </a:t>
             </a:r>
             <a:r>
@@ -11453,14 +11917,22 @@
                 <a:solidFill>
                   <a:srgbClr val="7030A0"/>
                 </a:solidFill>
+                <a:latin typeface="微软雅黑" panose="020B0503020204020204" pitchFamily="34" charset="-122"/>
+                <a:ea typeface="微软雅黑" panose="020B0503020204020204" pitchFamily="34" charset="-122"/>
               </a:rPr>
               <a:t>translation schemes </a:t>
             </a:r>
             <a:r>
-              <a:rPr lang="en-US" altLang="zh-CN" dirty="0"/>
+              <a:rPr lang="en-US" altLang="zh-CN" dirty="0">
+                <a:latin typeface="微软雅黑" panose="020B0503020204020204" pitchFamily="34" charset="-122"/>
+                <a:ea typeface="微软雅黑" panose="020B0503020204020204" pitchFamily="34" charset="-122"/>
+              </a:rPr>
               <a:t>can be more efficient , and hence more useful for implementations.</a:t>
             </a:r>
-            <a:endParaRPr lang="zh-CN" altLang="en-US" dirty="0"/>
+            <a:endParaRPr lang="zh-CN" altLang="en-US" dirty="0">
+              <a:latin typeface="微软雅黑" panose="020B0503020204020204" pitchFamily="34" charset="-122"/>
+              <a:ea typeface="微软雅黑" panose="020B0503020204020204" pitchFamily="34" charset="-122"/>
+            </a:endParaRPr>
           </a:p>
         </p:txBody>
       </p:sp>
@@ -11511,7 +11983,7 @@
           <p:cNvPr id="2" name="标题 1">
             <a:extLst>
               <a:ext uri="{FF2B5EF4-FFF2-40B4-BE49-F238E27FC236}">
-                <a16:creationId xmlns:a16="http://schemas.microsoft.com/office/drawing/2014/main" id="{0DD30E7F-B65C-4295-A0CF-6CA3E34F8DD8}"/>
+                <a16:creationId xmlns:a16="http://schemas.microsoft.com/office/drawing/2014/main" xmlns="" id="{0DD30E7F-B65C-4295-A0CF-6CA3E34F8DD8}"/>
               </a:ext>
             </a:extLst>
           </p:cNvPr>
@@ -11540,7 +12012,7 @@
           <p:cNvPr id="3" name="内容占位符 2">
             <a:extLst>
               <a:ext uri="{FF2B5EF4-FFF2-40B4-BE49-F238E27FC236}">
-                <a16:creationId xmlns:a16="http://schemas.microsoft.com/office/drawing/2014/main" id="{6075EA04-0D09-47A3-898C-E17D4DE095B3}"/>
+                <a16:creationId xmlns:a16="http://schemas.microsoft.com/office/drawing/2014/main" xmlns="" id="{6075EA04-0D09-47A3-898C-E17D4DE095B3}"/>
               </a:ext>
             </a:extLst>
           </p:cNvPr>
@@ -11723,31 +12195,71 @@
               <a:t>for a nonterminal </a:t>
             </a:r>
             <a:r>
+              <a:rPr lang="en-US" altLang="zh-CN" sz="1800" i="1" dirty="0">
+                <a:solidFill>
+                  <a:srgbClr val="FF0000"/>
+                </a:solidFill>
+              </a:rPr>
+              <a:t>A</a:t>
+            </a:r>
+            <a:r>
               <a:rPr lang="en-US" altLang="zh-CN" sz="1800" i="1" dirty="0"/>
-              <a:t>A </a:t>
+              <a:t> </a:t>
             </a:r>
             <a:r>
               <a:rPr lang="en-US" altLang="zh-CN" sz="1800" dirty="0"/>
               <a:t>at a parse-tree node </a:t>
             </a:r>
             <a:r>
-              <a:rPr lang="en-US" altLang="zh-CN" sz="1800" i="1" dirty="0"/>
+              <a:rPr lang="en-US" altLang="zh-CN" sz="1800" i="1" dirty="0">
+                <a:solidFill>
+                  <a:srgbClr val="00B050"/>
+                </a:solidFill>
+              </a:rPr>
               <a:t>N </a:t>
             </a:r>
             <a:r>
+              <a:rPr lang="en-US" altLang="zh-CN" sz="1800" i="1" dirty="0" smtClean="0">
+                <a:solidFill>
+                  <a:srgbClr val="00B050"/>
+                </a:solidFill>
+              </a:rPr>
+              <a:t> </a:t>
+            </a:r>
+            <a:r>
+              <a:rPr lang="en-US" altLang="zh-CN" sz="1800" dirty="0" smtClean="0"/>
+              <a:t>is </a:t>
+            </a:r>
+            <a:r>
               <a:rPr lang="en-US" altLang="zh-CN" sz="1800" dirty="0"/>
-              <a:t>is defined by a semantic rule associated with the production at </a:t>
-            </a:r>
-            <a:r>
-              <a:rPr lang="en-US" altLang="zh-CN" sz="1800" i="1" dirty="0"/>
+              <a:t>defined by a semantic rule associated with the production at </a:t>
+            </a:r>
+            <a:r>
+              <a:rPr lang="en-US" altLang="zh-CN" sz="1800" i="1" dirty="0">
+                <a:solidFill>
+                  <a:srgbClr val="00B050"/>
+                </a:solidFill>
+              </a:rPr>
               <a:t>N</a:t>
             </a:r>
             <a:r>
               <a:rPr lang="en-US" altLang="zh-CN" sz="1800" dirty="0"/>
-              <a:t>. Note that the production must have </a:t>
-            </a:r>
-            <a:r>
-              <a:rPr lang="en-US" altLang="zh-CN" sz="1800" i="1" dirty="0"/>
+              <a:t>. </a:t>
+            </a:r>
+            <a:r>
+              <a:rPr lang="en-US" altLang="zh-CN" sz="1800" dirty="0" smtClean="0"/>
+              <a:t>   Note </a:t>
+            </a:r>
+            <a:r>
+              <a:rPr lang="en-US" altLang="zh-CN" sz="1800" dirty="0"/>
+              <a:t>that the production must have </a:t>
+            </a:r>
+            <a:r>
+              <a:rPr lang="en-US" altLang="zh-CN" sz="1800" i="1" dirty="0">
+                <a:solidFill>
+                  <a:srgbClr val="FF0000"/>
+                </a:solidFill>
+              </a:rPr>
               <a:t>A</a:t>
             </a:r>
             <a:r>
@@ -11755,23 +12267,35 @@
               <a:t> as its head. </a:t>
             </a:r>
             <a:r>
+              <a:rPr lang="en-US" altLang="zh-CN" sz="1800" dirty="0" smtClean="0"/>
+              <a:t>A synthesized </a:t>
+            </a:r>
+            <a:r>
+              <a:rPr lang="en-US" altLang="zh-CN" sz="1800" dirty="0"/>
+              <a:t>attribute at node </a:t>
+            </a:r>
+            <a:r>
+              <a:rPr lang="en-US" altLang="zh-CN" sz="1800" i="1" dirty="0">
+                <a:solidFill>
+                  <a:srgbClr val="00B050"/>
+                </a:solidFill>
+              </a:rPr>
+              <a:t>N</a:t>
+            </a:r>
+            <a:r>
               <a:rPr lang="en-US" altLang="zh-CN" sz="1800" i="1" dirty="0"/>
-              <a:t>A</a:t>
-            </a:r>
-            <a:r>
-              <a:rPr lang="en-US" altLang="zh-CN" sz="1800" dirty="0"/>
-              <a:t> synthesized attribute at node </a:t>
-            </a:r>
-            <a:r>
-              <a:rPr lang="en-US" altLang="zh-CN" sz="1800" i="1" dirty="0"/>
-              <a:t>N </a:t>
+              <a:t> </a:t>
             </a:r>
             <a:r>
               <a:rPr lang="en-US" altLang="zh-CN" sz="1800" dirty="0"/>
               <a:t>is defined only in terms of attribute values at the children of </a:t>
             </a:r>
             <a:r>
-              <a:rPr lang="en-US" altLang="zh-CN" sz="1800" i="1" dirty="0"/>
+              <a:rPr lang="en-US" altLang="zh-CN" sz="1800" i="1" dirty="0">
+                <a:solidFill>
+                  <a:srgbClr val="00B050"/>
+                </a:solidFill>
+              </a:rPr>
               <a:t>N</a:t>
             </a:r>
             <a:r>
@@ -11779,7 +12303,11 @@
               <a:t> and at </a:t>
             </a:r>
             <a:r>
-              <a:rPr lang="en-US" altLang="zh-CN" sz="1800" i="1" dirty="0"/>
+              <a:rPr lang="en-US" altLang="zh-CN" sz="1800" i="1" dirty="0">
+                <a:solidFill>
+                  <a:srgbClr val="00B050"/>
+                </a:solidFill>
+              </a:rPr>
               <a:t>N</a:t>
             </a:r>
             <a:r>
@@ -11814,7 +12342,11 @@
               <a:t>for a nonterminal </a:t>
             </a:r>
             <a:r>
-              <a:rPr lang="en-US" altLang="zh-CN" sz="1800" i="1" dirty="0"/>
+              <a:rPr lang="en-US" altLang="zh-CN" sz="1800" i="1" dirty="0">
+                <a:solidFill>
+                  <a:srgbClr val="FF0000"/>
+                </a:solidFill>
+              </a:rPr>
               <a:t>B</a:t>
             </a:r>
             <a:r>
@@ -11822,7 +12354,11 @@
               <a:t> at a parse-tree node </a:t>
             </a:r>
             <a:r>
-              <a:rPr lang="en-US" altLang="zh-CN" sz="1800" i="1" dirty="0"/>
+              <a:rPr lang="en-US" altLang="zh-CN" sz="1800" i="1" dirty="0">
+                <a:solidFill>
+                  <a:srgbClr val="00B050"/>
+                </a:solidFill>
+              </a:rPr>
               <a:t>N</a:t>
             </a:r>
             <a:r>
@@ -11830,15 +12366,31 @@
               <a:t> is defined by a semantic rule associated with the production at the parent of </a:t>
             </a:r>
             <a:r>
-              <a:rPr lang="en-US" altLang="zh-CN" sz="1800" i="1" dirty="0"/>
+              <a:rPr lang="en-US" altLang="zh-CN" sz="1800" i="1" dirty="0">
+                <a:solidFill>
+                  <a:srgbClr val="00B050"/>
+                </a:solidFill>
+              </a:rPr>
               <a:t>N</a:t>
             </a:r>
             <a:r>
               <a:rPr lang="en-US" altLang="zh-CN" sz="1800" dirty="0"/>
-              <a:t>. Note that the production must have </a:t>
-            </a:r>
-            <a:r>
-              <a:rPr lang="en-US" altLang="zh-CN" sz="1800" i="1" dirty="0"/>
+              <a:t>. </a:t>
+            </a:r>
+            <a:r>
+              <a:rPr lang="en-US" altLang="zh-CN" sz="1800" dirty="0" smtClean="0"/>
+              <a:t> Note </a:t>
+            </a:r>
+            <a:r>
+              <a:rPr lang="en-US" altLang="zh-CN" sz="1800" dirty="0"/>
+              <a:t>that the production must have </a:t>
+            </a:r>
+            <a:r>
+              <a:rPr lang="en-US" altLang="zh-CN" sz="1800" i="1" dirty="0">
+                <a:solidFill>
+                  <a:srgbClr val="FF0000"/>
+                </a:solidFill>
+              </a:rPr>
               <a:t>B</a:t>
             </a:r>
             <a:r>
@@ -11846,15 +12398,31 @@
               <a:t> as a symbol in its body. An inherited attribute at node </a:t>
             </a:r>
             <a:r>
-              <a:rPr lang="en-US" altLang="zh-CN" sz="1800" i="1" dirty="0"/>
+              <a:rPr lang="en-US" altLang="zh-CN" sz="1800" i="1" dirty="0">
+                <a:solidFill>
+                  <a:srgbClr val="00B050"/>
+                </a:solidFill>
+              </a:rPr>
               <a:t>N</a:t>
             </a:r>
             <a:r>
+              <a:rPr lang="en-US" altLang="zh-CN" sz="1800" dirty="0">
+                <a:solidFill>
+                  <a:srgbClr val="00B050"/>
+                </a:solidFill>
+              </a:rPr>
+              <a:t> </a:t>
+            </a:r>
+            <a:r>
               <a:rPr lang="en-US" altLang="zh-CN" sz="1800" dirty="0"/>
-              <a:t> is defined only in terms of attribute values at </a:t>
-            </a:r>
-            <a:r>
-              <a:rPr lang="en-US" altLang="zh-CN" sz="1800" i="1" dirty="0"/>
+              <a:t>is defined only in terms of attribute values at </a:t>
+            </a:r>
+            <a:r>
+              <a:rPr lang="en-US" altLang="zh-CN" sz="1800" i="1" dirty="0">
+                <a:solidFill>
+                  <a:srgbClr val="00B050"/>
+                </a:solidFill>
+              </a:rPr>
               <a:t>N</a:t>
             </a:r>
             <a:r>
@@ -11862,15 +12430,31 @@
               <a:t>'s parent , </a:t>
             </a:r>
             <a:r>
-              <a:rPr lang="en-US" altLang="zh-CN" sz="1800" i="1" dirty="0"/>
+              <a:rPr lang="en-US" altLang="zh-CN" sz="1800" i="1" dirty="0">
+                <a:solidFill>
+                  <a:srgbClr val="00B050"/>
+                </a:solidFill>
+              </a:rPr>
               <a:t>N</a:t>
             </a:r>
             <a:r>
+              <a:rPr lang="en-US" altLang="zh-CN" sz="1800" dirty="0">
+                <a:solidFill>
+                  <a:srgbClr val="00B050"/>
+                </a:solidFill>
+              </a:rPr>
+              <a:t> </a:t>
+            </a:r>
+            <a:r>
               <a:rPr lang="en-US" altLang="zh-CN" sz="1800" dirty="0"/>
-              <a:t> itself, and </a:t>
-            </a:r>
-            <a:r>
-              <a:rPr lang="en-US" altLang="zh-CN" sz="1800" i="1" dirty="0"/>
+              <a:t>itself, and </a:t>
+            </a:r>
+            <a:r>
+              <a:rPr lang="en-US" altLang="zh-CN" sz="1800" i="1" dirty="0">
+                <a:solidFill>
+                  <a:srgbClr val="00B050"/>
+                </a:solidFill>
+              </a:rPr>
               <a:t>N</a:t>
             </a:r>
             <a:r>
@@ -11965,8 +12549,8 @@
         </p:nvSpPr>
         <p:spPr>
           <a:xfrm>
-            <a:off x="828675" y="1600200"/>
-            <a:ext cx="7486650" cy="1034143"/>
+            <a:off x="828675" y="1375640"/>
+            <a:ext cx="7486650" cy="1224287"/>
           </a:xfrm>
         </p:spPr>
         <p:txBody>
@@ -11975,9 +12559,22 @@
           </a:bodyPr>
           <a:lstStyle/>
           <a:p>
+            <a:pPr>
+              <a:lnSpc>
+                <a:spcPct val="100000"/>
+              </a:lnSpc>
+            </a:pPr>
+            <a:r>
+              <a:rPr lang="en-US" altLang="zh-CN" sz="1600" dirty="0">
+                <a:solidFill>
+                  <a:srgbClr val="7030A0"/>
+                </a:solidFill>
+              </a:rPr>
+              <a:t>Terminals can have synthesized attributes, but not inherited attributes. </a:t>
+            </a:r>
             <a:r>
               <a:rPr lang="en-US" altLang="zh-CN" sz="1600" dirty="0"/>
-              <a:t>Terminals can have synthesized attributes, but not inherited attributes. Attributes for terminals have lexical values that are supplied by the lexical analyzer; there are no semantic rules in the SDD itself for computing the value of an attribute for a terminal.</a:t>
+              <a:t>Attributes for terminals have lexical values that are supplied by the lexical analyzer; there are no semantic rules in the SDD itself for computing the value of an attribute for a terminal.</a:t>
             </a:r>
             <a:endParaRPr lang="zh-CN" altLang="en-US" sz="1600" dirty="0"/>
           </a:p>
@@ -11999,7 +12596,7 @@
         </p:blipFill>
         <p:spPr>
           <a:xfrm>
-            <a:off x="413657" y="2483423"/>
+            <a:off x="828675" y="2437557"/>
             <a:ext cx="6999514" cy="4179397"/>
           </a:xfrm>
           <a:prstGeom prst="rect">
@@ -12015,7 +12612,7 @@
         </p:nvCxnSpPr>
         <p:spPr>
           <a:xfrm flipV="1">
-            <a:off x="7184571" y="3429000"/>
+            <a:off x="6911105" y="3284365"/>
             <a:ext cx="457200" cy="10886"/>
           </a:xfrm>
           <a:prstGeom prst="line">
@@ -12050,7 +12647,7 @@
         </p:nvCxnSpPr>
         <p:spPr>
           <a:xfrm flipV="1">
-            <a:off x="1219200" y="3668486"/>
+            <a:off x="1014100" y="3439886"/>
             <a:ext cx="1632857" cy="10885"/>
           </a:xfrm>
           <a:prstGeom prst="line">
@@ -12082,7 +12679,7 @@
           <p:cNvPr id="5" name="矩形 4">
             <a:extLst>
               <a:ext uri="{FF2B5EF4-FFF2-40B4-BE49-F238E27FC236}">
-                <a16:creationId xmlns:a16="http://schemas.microsoft.com/office/drawing/2014/main" id="{FBE9844D-C192-48E5-88DA-64FBFEC76C67}"/>
+                <a16:creationId xmlns:a16="http://schemas.microsoft.com/office/drawing/2014/main" xmlns="" id="{FBE9844D-C192-48E5-88DA-64FBFEC76C67}"/>
               </a:ext>
             </a:extLst>
           </p:cNvPr>
@@ -12091,8 +12688,8 @@
         </p:nvSpPr>
         <p:spPr>
           <a:xfrm>
-            <a:off x="5992301" y="4026693"/>
-            <a:ext cx="3070340" cy="2462213"/>
+            <a:off x="6171763" y="3979689"/>
+            <a:ext cx="2972237" cy="2677656"/>
           </a:xfrm>
           <a:prstGeom prst="rect">
             <a:avLst/>
@@ -12105,72 +12702,353 @@
           <a:lstStyle/>
           <a:p>
             <a:r>
-              <a:rPr lang="en-US" altLang="zh-CN" sz="1400" dirty="0"/>
+              <a:rPr lang="en-US" altLang="zh-CN" sz="1200" dirty="0">
+                <a:latin typeface="微软雅黑" panose="020B0503020204020204" pitchFamily="34" charset="-122"/>
+                <a:ea typeface="微软雅黑" panose="020B0503020204020204" pitchFamily="34" charset="-122"/>
+              </a:rPr>
               <a:t>The rule for production 1 , sets </a:t>
             </a:r>
             <a:r>
-              <a:rPr lang="en-US" altLang="zh-CN" sz="1400" dirty="0" err="1"/>
+              <a:rPr lang="en-US" altLang="zh-CN" sz="1200" i="1" dirty="0" err="1">
+                <a:solidFill>
+                  <a:srgbClr val="00B050"/>
+                </a:solidFill>
+                <a:latin typeface="微软雅黑" panose="020B0503020204020204" pitchFamily="34" charset="-122"/>
+                <a:ea typeface="微软雅黑" panose="020B0503020204020204" pitchFamily="34" charset="-122"/>
+              </a:rPr>
               <a:t>L.val</a:t>
             </a:r>
             <a:r>
-              <a:rPr lang="en-US" altLang="zh-CN" sz="1400" dirty="0"/>
-              <a:t> to </a:t>
-            </a:r>
-            <a:r>
-              <a:rPr lang="en-US" altLang="zh-CN" sz="1400" dirty="0" err="1"/>
+              <a:rPr lang="en-US" altLang="zh-CN" sz="1200" i="1" dirty="0">
+                <a:solidFill>
+                  <a:srgbClr val="00B050"/>
+                </a:solidFill>
+                <a:latin typeface="微软雅黑" panose="020B0503020204020204" pitchFamily="34" charset="-122"/>
+                <a:ea typeface="微软雅黑" panose="020B0503020204020204" pitchFamily="34" charset="-122"/>
+              </a:rPr>
+              <a:t> </a:t>
+            </a:r>
+            <a:r>
+              <a:rPr lang="en-US" altLang="zh-CN" sz="1200" dirty="0">
+                <a:latin typeface="微软雅黑" panose="020B0503020204020204" pitchFamily="34" charset="-122"/>
+                <a:ea typeface="微软雅黑" panose="020B0503020204020204" pitchFamily="34" charset="-122"/>
+              </a:rPr>
+              <a:t>to </a:t>
+            </a:r>
+            <a:r>
+              <a:rPr lang="en-US" altLang="zh-CN" sz="1200" i="1" dirty="0" err="1">
+                <a:solidFill>
+                  <a:srgbClr val="00B050"/>
+                </a:solidFill>
+                <a:latin typeface="微软雅黑" panose="020B0503020204020204" pitchFamily="34" charset="-122"/>
+                <a:ea typeface="微软雅黑" panose="020B0503020204020204" pitchFamily="34" charset="-122"/>
+              </a:rPr>
               <a:t>E.val</a:t>
             </a:r>
             <a:r>
-              <a:rPr lang="en-US" altLang="zh-CN" sz="1400" dirty="0"/>
-              <a:t>, which we shall see is the numerical value of the entire expression.</a:t>
-            </a:r>
-          </a:p>
-          <a:p>
-            <a:r>
-              <a:rPr lang="en-US" altLang="zh-CN" sz="1400" dirty="0"/>
+              <a:rPr lang="en-US" altLang="zh-CN" sz="1200" dirty="0">
+                <a:latin typeface="微软雅黑" panose="020B0503020204020204" pitchFamily="34" charset="-122"/>
+                <a:ea typeface="微软雅黑" panose="020B0503020204020204" pitchFamily="34" charset="-122"/>
+              </a:rPr>
+              <a:t>, which we shall see is the numerical value of the entire expression</a:t>
+            </a:r>
+            <a:r>
+              <a:rPr lang="en-US" altLang="zh-CN" sz="1200" dirty="0" smtClean="0">
+                <a:latin typeface="微软雅黑" panose="020B0503020204020204" pitchFamily="34" charset="-122"/>
+                <a:ea typeface="微软雅黑" panose="020B0503020204020204" pitchFamily="34" charset="-122"/>
+              </a:rPr>
+              <a:t>.</a:t>
+            </a:r>
+          </a:p>
+          <a:p>
+            <a:endParaRPr lang="en-US" altLang="zh-CN" sz="1200" dirty="0">
+              <a:latin typeface="微软雅黑" panose="020B0503020204020204" pitchFamily="34" charset="-122"/>
+              <a:ea typeface="微软雅黑" panose="020B0503020204020204" pitchFamily="34" charset="-122"/>
+            </a:endParaRPr>
+          </a:p>
+          <a:p>
+            <a:r>
+              <a:rPr lang="en-US" altLang="zh-CN" sz="1200" dirty="0">
+                <a:latin typeface="微软雅黑" panose="020B0503020204020204" pitchFamily="34" charset="-122"/>
+                <a:ea typeface="微软雅黑" panose="020B0503020204020204" pitchFamily="34" charset="-122"/>
+              </a:rPr>
               <a:t>Production 2 also has one rule, which computes the </a:t>
             </a:r>
             <a:r>
-              <a:rPr lang="en-US" altLang="zh-CN" sz="1400" dirty="0" err="1"/>
+              <a:rPr lang="en-US" altLang="zh-CN" sz="1200" i="1" dirty="0" err="1">
+                <a:solidFill>
+                  <a:srgbClr val="00B050"/>
+                </a:solidFill>
+                <a:latin typeface="微软雅黑" panose="020B0503020204020204" pitchFamily="34" charset="-122"/>
+                <a:ea typeface="微软雅黑" panose="020B0503020204020204" pitchFamily="34" charset="-122"/>
+              </a:rPr>
               <a:t>val</a:t>
             </a:r>
             <a:r>
-              <a:rPr lang="en-US" altLang="zh-CN" sz="1400" dirty="0"/>
-              <a:t> attribute for the head E as the sum of the values at E</a:t>
-            </a:r>
-            <a:r>
-              <a:rPr lang="en-US" altLang="zh-CN" sz="1400" baseline="-25000" dirty="0"/>
-              <a:t>1 </a:t>
-            </a:r>
-            <a:r>
-              <a:rPr lang="en-US" altLang="zh-CN" sz="1400" dirty="0"/>
-              <a:t>and T. At any parse tree node N labeled E, the value of </a:t>
-            </a:r>
-            <a:r>
-              <a:rPr lang="en-US" altLang="zh-CN" sz="1400" dirty="0" err="1"/>
+              <a:rPr lang="en-US" altLang="zh-CN" sz="1200" dirty="0">
+                <a:solidFill>
+                  <a:srgbClr val="00B050"/>
+                </a:solidFill>
+                <a:latin typeface="微软雅黑" panose="020B0503020204020204" pitchFamily="34" charset="-122"/>
+                <a:ea typeface="微软雅黑" panose="020B0503020204020204" pitchFamily="34" charset="-122"/>
+              </a:rPr>
+              <a:t> </a:t>
+            </a:r>
+            <a:r>
+              <a:rPr lang="en-US" altLang="zh-CN" sz="1200" dirty="0">
+                <a:latin typeface="微软雅黑" panose="020B0503020204020204" pitchFamily="34" charset="-122"/>
+                <a:ea typeface="微软雅黑" panose="020B0503020204020204" pitchFamily="34" charset="-122"/>
+              </a:rPr>
+              <a:t>attribute for the head </a:t>
+            </a:r>
+            <a:r>
+              <a:rPr lang="en-US" altLang="zh-CN" sz="1200" i="1" dirty="0">
+                <a:solidFill>
+                  <a:srgbClr val="00B050"/>
+                </a:solidFill>
+                <a:latin typeface="微软雅黑" panose="020B0503020204020204" pitchFamily="34" charset="-122"/>
+                <a:ea typeface="微软雅黑" panose="020B0503020204020204" pitchFamily="34" charset="-122"/>
+              </a:rPr>
+              <a:t>E</a:t>
+            </a:r>
+            <a:r>
+              <a:rPr lang="en-US" altLang="zh-CN" sz="1200" dirty="0">
+                <a:latin typeface="微软雅黑" panose="020B0503020204020204" pitchFamily="34" charset="-122"/>
+                <a:ea typeface="微软雅黑" panose="020B0503020204020204" pitchFamily="34" charset="-122"/>
+              </a:rPr>
+              <a:t> as the sum of the values at </a:t>
+            </a:r>
+            <a:r>
+              <a:rPr lang="en-US" altLang="zh-CN" sz="1200" i="1" dirty="0">
+                <a:solidFill>
+                  <a:srgbClr val="00B050"/>
+                </a:solidFill>
+                <a:latin typeface="微软雅黑" panose="020B0503020204020204" pitchFamily="34" charset="-122"/>
+                <a:ea typeface="微软雅黑" panose="020B0503020204020204" pitchFamily="34" charset="-122"/>
+              </a:rPr>
+              <a:t>E</a:t>
+            </a:r>
+            <a:r>
+              <a:rPr lang="en-US" altLang="zh-CN" sz="1200" i="1" baseline="-25000" dirty="0">
+                <a:solidFill>
+                  <a:srgbClr val="00B050"/>
+                </a:solidFill>
+                <a:latin typeface="微软雅黑" panose="020B0503020204020204" pitchFamily="34" charset="-122"/>
+                <a:ea typeface="微软雅黑" panose="020B0503020204020204" pitchFamily="34" charset="-122"/>
+              </a:rPr>
+              <a:t>1</a:t>
+            </a:r>
+            <a:r>
+              <a:rPr lang="en-US" altLang="zh-CN" sz="1200" baseline="-25000" dirty="0">
+                <a:latin typeface="微软雅黑" panose="020B0503020204020204" pitchFamily="34" charset="-122"/>
+                <a:ea typeface="微软雅黑" panose="020B0503020204020204" pitchFamily="34" charset="-122"/>
+              </a:rPr>
+              <a:t> </a:t>
+            </a:r>
+            <a:r>
+              <a:rPr lang="en-US" altLang="zh-CN" sz="1200" dirty="0">
+                <a:latin typeface="微软雅黑" panose="020B0503020204020204" pitchFamily="34" charset="-122"/>
+                <a:ea typeface="微软雅黑" panose="020B0503020204020204" pitchFamily="34" charset="-122"/>
+              </a:rPr>
+              <a:t>and </a:t>
+            </a:r>
+            <a:r>
+              <a:rPr lang="en-US" altLang="zh-CN" sz="1200" i="1" dirty="0">
+                <a:solidFill>
+                  <a:srgbClr val="00B050"/>
+                </a:solidFill>
+                <a:latin typeface="微软雅黑" panose="020B0503020204020204" pitchFamily="34" charset="-122"/>
+                <a:ea typeface="微软雅黑" panose="020B0503020204020204" pitchFamily="34" charset="-122"/>
+              </a:rPr>
+              <a:t>T</a:t>
+            </a:r>
+            <a:r>
+              <a:rPr lang="en-US" altLang="zh-CN" sz="1200" dirty="0">
+                <a:latin typeface="微软雅黑" panose="020B0503020204020204" pitchFamily="34" charset="-122"/>
+                <a:ea typeface="微软雅黑" panose="020B0503020204020204" pitchFamily="34" charset="-122"/>
+              </a:rPr>
+              <a:t>. </a:t>
+            </a:r>
+            <a:endParaRPr lang="en-US" altLang="zh-CN" sz="1200" dirty="0" smtClean="0">
+              <a:latin typeface="微软雅黑" panose="020B0503020204020204" pitchFamily="34" charset="-122"/>
+              <a:ea typeface="微软雅黑" panose="020B0503020204020204" pitchFamily="34" charset="-122"/>
+            </a:endParaRPr>
+          </a:p>
+          <a:p>
+            <a:endParaRPr lang="en-US" altLang="zh-CN" sz="1200" dirty="0">
+              <a:latin typeface="微软雅黑" panose="020B0503020204020204" pitchFamily="34" charset="-122"/>
+              <a:ea typeface="微软雅黑" panose="020B0503020204020204" pitchFamily="34" charset="-122"/>
+            </a:endParaRPr>
+          </a:p>
+          <a:p>
+            <a:r>
+              <a:rPr lang="en-US" altLang="zh-CN" sz="1200" dirty="0" smtClean="0">
+                <a:latin typeface="微软雅黑" panose="020B0503020204020204" pitchFamily="34" charset="-122"/>
+                <a:ea typeface="微软雅黑" panose="020B0503020204020204" pitchFamily="34" charset="-122"/>
+              </a:rPr>
+              <a:t>At </a:t>
+            </a:r>
+            <a:r>
+              <a:rPr lang="en-US" altLang="zh-CN" sz="1200" dirty="0">
+                <a:latin typeface="微软雅黑" panose="020B0503020204020204" pitchFamily="34" charset="-122"/>
+                <a:ea typeface="微软雅黑" panose="020B0503020204020204" pitchFamily="34" charset="-122"/>
+              </a:rPr>
+              <a:t>any parse tree node </a:t>
+            </a:r>
+            <a:r>
+              <a:rPr lang="en-US" altLang="zh-CN" sz="1200" i="1" dirty="0">
+                <a:solidFill>
+                  <a:srgbClr val="00B050"/>
+                </a:solidFill>
+                <a:latin typeface="微软雅黑" panose="020B0503020204020204" pitchFamily="34" charset="-122"/>
+                <a:ea typeface="微软雅黑" panose="020B0503020204020204" pitchFamily="34" charset="-122"/>
+              </a:rPr>
+              <a:t>N</a:t>
+            </a:r>
+            <a:r>
+              <a:rPr lang="en-US" altLang="zh-CN" sz="1200" dirty="0">
+                <a:latin typeface="微软雅黑" panose="020B0503020204020204" pitchFamily="34" charset="-122"/>
+                <a:ea typeface="微软雅黑" panose="020B0503020204020204" pitchFamily="34" charset="-122"/>
+              </a:rPr>
+              <a:t> labeled </a:t>
+            </a:r>
+            <a:r>
+              <a:rPr lang="en-US" altLang="zh-CN" sz="1200" i="1" dirty="0">
+                <a:solidFill>
+                  <a:srgbClr val="00B050"/>
+                </a:solidFill>
+                <a:latin typeface="微软雅黑" panose="020B0503020204020204" pitchFamily="34" charset="-122"/>
+                <a:ea typeface="微软雅黑" panose="020B0503020204020204" pitchFamily="34" charset="-122"/>
+              </a:rPr>
+              <a:t>E</a:t>
+            </a:r>
+            <a:r>
+              <a:rPr lang="en-US" altLang="zh-CN" sz="1200" dirty="0">
+                <a:latin typeface="微软雅黑" panose="020B0503020204020204" pitchFamily="34" charset="-122"/>
+                <a:ea typeface="微软雅黑" panose="020B0503020204020204" pitchFamily="34" charset="-122"/>
+              </a:rPr>
+              <a:t>, the value of </a:t>
+            </a:r>
+            <a:r>
+              <a:rPr lang="en-US" altLang="zh-CN" sz="1200" i="1" dirty="0" err="1">
+                <a:solidFill>
+                  <a:srgbClr val="00B050"/>
+                </a:solidFill>
+                <a:latin typeface="微软雅黑" panose="020B0503020204020204" pitchFamily="34" charset="-122"/>
+                <a:ea typeface="微软雅黑" panose="020B0503020204020204" pitchFamily="34" charset="-122"/>
+              </a:rPr>
               <a:t>val</a:t>
             </a:r>
             <a:r>
-              <a:rPr lang="en-US" altLang="zh-CN" sz="1400" dirty="0"/>
-              <a:t> for E is the sum of the values of </a:t>
-            </a:r>
-            <a:r>
-              <a:rPr lang="en-US" altLang="zh-CN" sz="1400" dirty="0" err="1"/>
+              <a:rPr lang="en-US" altLang="zh-CN" sz="1200" dirty="0">
+                <a:latin typeface="微软雅黑" panose="020B0503020204020204" pitchFamily="34" charset="-122"/>
+                <a:ea typeface="微软雅黑" panose="020B0503020204020204" pitchFamily="34" charset="-122"/>
+              </a:rPr>
+              <a:t> for </a:t>
+            </a:r>
+            <a:r>
+              <a:rPr lang="en-US" altLang="zh-CN" sz="1200" i="1" dirty="0">
+                <a:solidFill>
+                  <a:srgbClr val="00B050"/>
+                </a:solidFill>
+                <a:latin typeface="微软雅黑" panose="020B0503020204020204" pitchFamily="34" charset="-122"/>
+                <a:ea typeface="微软雅黑" panose="020B0503020204020204" pitchFamily="34" charset="-122"/>
+              </a:rPr>
+              <a:t>E</a:t>
+            </a:r>
+            <a:r>
+              <a:rPr lang="en-US" altLang="zh-CN" sz="1200" dirty="0">
+                <a:latin typeface="微软雅黑" panose="020B0503020204020204" pitchFamily="34" charset="-122"/>
+                <a:ea typeface="微软雅黑" panose="020B0503020204020204" pitchFamily="34" charset="-122"/>
+              </a:rPr>
+              <a:t> is the sum of the values of </a:t>
+            </a:r>
+            <a:r>
+              <a:rPr lang="en-US" altLang="zh-CN" sz="1200" i="1" dirty="0" err="1">
+                <a:solidFill>
+                  <a:srgbClr val="00B050"/>
+                </a:solidFill>
+                <a:latin typeface="微软雅黑" panose="020B0503020204020204" pitchFamily="34" charset="-122"/>
+                <a:ea typeface="微软雅黑" panose="020B0503020204020204" pitchFamily="34" charset="-122"/>
+              </a:rPr>
               <a:t>val</a:t>
             </a:r>
             <a:r>
-              <a:rPr lang="en-US" altLang="zh-CN" sz="1400" dirty="0"/>
+              <a:rPr lang="en-US" altLang="zh-CN" sz="1200" dirty="0">
+                <a:latin typeface="微软雅黑" panose="020B0503020204020204" pitchFamily="34" charset="-122"/>
+                <a:ea typeface="微软雅黑" panose="020B0503020204020204" pitchFamily="34" charset="-122"/>
+              </a:rPr>
               <a:t> </a:t>
             </a:r>
             <a:r>
-              <a:rPr lang="en-US" altLang="zh-CN" sz="1400" dirty="0" err="1"/>
-              <a:t>atthe</a:t>
-            </a:r>
-            <a:r>
-              <a:rPr lang="en-US" altLang="zh-CN" sz="1400" dirty="0"/>
-              <a:t> children of node N labeled E and T.</a:t>
-            </a:r>
-            <a:endParaRPr lang="zh-CN" altLang="en-US" sz="1400" dirty="0"/>
+              <a:rPr lang="en-US" altLang="zh-CN" sz="1200" dirty="0" smtClean="0">
+                <a:latin typeface="微软雅黑" panose="020B0503020204020204" pitchFamily="34" charset="-122"/>
+                <a:ea typeface="微软雅黑" panose="020B0503020204020204" pitchFamily="34" charset="-122"/>
+              </a:rPr>
+              <a:t>at the </a:t>
+            </a:r>
+            <a:r>
+              <a:rPr lang="en-US" altLang="zh-CN" sz="1200" dirty="0">
+                <a:latin typeface="微软雅黑" panose="020B0503020204020204" pitchFamily="34" charset="-122"/>
+                <a:ea typeface="微软雅黑" panose="020B0503020204020204" pitchFamily="34" charset="-122"/>
+              </a:rPr>
+              <a:t>children of node </a:t>
+            </a:r>
+            <a:r>
+              <a:rPr lang="en-US" altLang="zh-CN" sz="1200" i="1" dirty="0">
+                <a:solidFill>
+                  <a:srgbClr val="00B050"/>
+                </a:solidFill>
+                <a:latin typeface="微软雅黑" panose="020B0503020204020204" pitchFamily="34" charset="-122"/>
+                <a:ea typeface="微软雅黑" panose="020B0503020204020204" pitchFamily="34" charset="-122"/>
+              </a:rPr>
+              <a:t>N</a:t>
+            </a:r>
+            <a:r>
+              <a:rPr lang="en-US" altLang="zh-CN" sz="1200" dirty="0">
+                <a:latin typeface="微软雅黑" panose="020B0503020204020204" pitchFamily="34" charset="-122"/>
+                <a:ea typeface="微软雅黑" panose="020B0503020204020204" pitchFamily="34" charset="-122"/>
+              </a:rPr>
+              <a:t> labeled </a:t>
+            </a:r>
+            <a:r>
+              <a:rPr lang="en-US" altLang="zh-CN" sz="1200" i="1" dirty="0">
+                <a:solidFill>
+                  <a:srgbClr val="00B050"/>
+                </a:solidFill>
+                <a:latin typeface="微软雅黑" panose="020B0503020204020204" pitchFamily="34" charset="-122"/>
+                <a:ea typeface="微软雅黑" panose="020B0503020204020204" pitchFamily="34" charset="-122"/>
+              </a:rPr>
+              <a:t>E</a:t>
+            </a:r>
+            <a:r>
+              <a:rPr lang="en-US" altLang="zh-CN" sz="1200" dirty="0">
+                <a:latin typeface="微软雅黑" panose="020B0503020204020204" pitchFamily="34" charset="-122"/>
+                <a:ea typeface="微软雅黑" panose="020B0503020204020204" pitchFamily="34" charset="-122"/>
+              </a:rPr>
+              <a:t> and </a:t>
+            </a:r>
+            <a:r>
+              <a:rPr lang="en-US" altLang="zh-CN" sz="1200" i="1" dirty="0">
+                <a:solidFill>
+                  <a:srgbClr val="00B050"/>
+                </a:solidFill>
+                <a:latin typeface="微软雅黑" panose="020B0503020204020204" pitchFamily="34" charset="-122"/>
+                <a:ea typeface="微软雅黑" panose="020B0503020204020204" pitchFamily="34" charset="-122"/>
+              </a:rPr>
+              <a:t>T</a:t>
+            </a:r>
+            <a:r>
+              <a:rPr lang="en-US" altLang="zh-CN" sz="1200" dirty="0">
+                <a:latin typeface="微软雅黑" panose="020B0503020204020204" pitchFamily="34" charset="-122"/>
+                <a:ea typeface="微软雅黑" panose="020B0503020204020204" pitchFamily="34" charset="-122"/>
+              </a:rPr>
+              <a:t>.</a:t>
+            </a:r>
+            <a:endParaRPr lang="zh-CN" altLang="en-US" sz="1200" dirty="0">
+              <a:latin typeface="微软雅黑" panose="020B0503020204020204" pitchFamily="34" charset="-122"/>
+              <a:ea typeface="微软雅黑" panose="020B0503020204020204" pitchFamily="34" charset="-122"/>
+            </a:endParaRPr>
           </a:p>
         </p:txBody>
       </p:sp>
@@ -13129,6 +14007,141 @@
 </file>
 
 <file path=customXml/item1.xml><?xml version="1.0" encoding="utf-8"?>
+<?mso-contentType ?>
+<FormTemplates xmlns="http://schemas.microsoft.com/sharepoint/v3/contenttype/forms">
+  <Display>DocumentLibraryForm</Display>
+  <Edit>AssetEditForm</Edit>
+  <New>DocumentLibraryForm</New>
+</FormTemplates>
+</file>
+
+<file path=customXml/item2.xml><?xml version="1.0" encoding="utf-8"?>
+<p:properties xmlns:p="http://schemas.microsoft.com/office/2006/metadata/properties" xmlns:xsi="http://www.w3.org/2001/XMLSchema-instance" xmlns:pc="http://schemas.microsoft.com/office/infopath/2007/PartnerControls">
+  <documentManagement>
+    <APDescription xmlns="4873beb7-5857-4685-be1f-d57550cc96cc" xsi:nil="true"/>
+    <AssetExpire xmlns="4873beb7-5857-4685-be1f-d57550cc96cc">2029-01-01T08:00:00+00:00</AssetExpire>
+    <CampaignTagsTaxHTField0 xmlns="4873beb7-5857-4685-be1f-d57550cc96cc">
+      <Terms xmlns="http://schemas.microsoft.com/office/infopath/2007/PartnerControls"/>
+    </CampaignTagsTaxHTField0>
+    <IntlLangReviewDate xmlns="4873beb7-5857-4685-be1f-d57550cc96cc" xsi:nil="true"/>
+    <TPFriendlyName xmlns="4873beb7-5857-4685-be1f-d57550cc96cc" xsi:nil="true"/>
+    <IntlLangReview xmlns="4873beb7-5857-4685-be1f-d57550cc96cc">false</IntlLangReview>
+    <LocLastLocAttemptVersionLookup xmlns="4873beb7-5857-4685-be1f-d57550cc96cc">855024</LocLastLocAttemptVersionLookup>
+    <PolicheckWords xmlns="4873beb7-5857-4685-be1f-d57550cc96cc" xsi:nil="true"/>
+    <SubmitterId xmlns="4873beb7-5857-4685-be1f-d57550cc96cc" xsi:nil="true"/>
+    <AcquiredFrom xmlns="4873beb7-5857-4685-be1f-d57550cc96cc">Internal MS</AcquiredFrom>
+    <EditorialStatus xmlns="4873beb7-5857-4685-be1f-d57550cc96cc">Complete</EditorialStatus>
+    <Markets xmlns="4873beb7-5857-4685-be1f-d57550cc96cc"/>
+    <OriginAsset xmlns="4873beb7-5857-4685-be1f-d57550cc96cc" xsi:nil="true"/>
+    <AssetStart xmlns="4873beb7-5857-4685-be1f-d57550cc96cc">2012-08-31T08:50:00+00:00</AssetStart>
+    <FriendlyTitle xmlns="4873beb7-5857-4685-be1f-d57550cc96cc" xsi:nil="true"/>
+    <MarketSpecific xmlns="4873beb7-5857-4685-be1f-d57550cc96cc">false</MarketSpecific>
+    <TPNamespace xmlns="4873beb7-5857-4685-be1f-d57550cc96cc" xsi:nil="true"/>
+    <PublishStatusLookup xmlns="4873beb7-5857-4685-be1f-d57550cc96cc">
+      <Value>1616423</Value>
+    </PublishStatusLookup>
+    <APAuthor xmlns="4873beb7-5857-4685-be1f-d57550cc96cc">
+      <UserInfo>
+        <DisplayName>REDMOND\kristaa</DisplayName>
+        <AccountId>136</AccountId>
+        <AccountType/>
+      </UserInfo>
+    </APAuthor>
+    <TPCommandLine xmlns="4873beb7-5857-4685-be1f-d57550cc96cc" xsi:nil="true"/>
+    <IntlLangReviewer xmlns="4873beb7-5857-4685-be1f-d57550cc96cc" xsi:nil="true"/>
+    <OpenTemplate xmlns="4873beb7-5857-4685-be1f-d57550cc96cc">true</OpenTemplate>
+    <CSXSubmissionDate xmlns="4873beb7-5857-4685-be1f-d57550cc96cc" xsi:nil="true"/>
+    <TaxCatchAll xmlns="4873beb7-5857-4685-be1f-d57550cc96cc"/>
+    <Manager xmlns="4873beb7-5857-4685-be1f-d57550cc96cc" xsi:nil="true"/>
+    <NumericId xmlns="4873beb7-5857-4685-be1f-d57550cc96cc" xsi:nil="true"/>
+    <ParentAssetId xmlns="4873beb7-5857-4685-be1f-d57550cc96cc" xsi:nil="true"/>
+    <OriginalSourceMarket xmlns="4873beb7-5857-4685-be1f-d57550cc96cc" xsi:nil="true"/>
+    <ApprovalStatus xmlns="4873beb7-5857-4685-be1f-d57550cc96cc">InProgress</ApprovalStatus>
+    <TPComponent xmlns="4873beb7-5857-4685-be1f-d57550cc96cc" xsi:nil="true"/>
+    <EditorialTags xmlns="4873beb7-5857-4685-be1f-d57550cc96cc" xsi:nil="true"/>
+    <TPExecutable xmlns="4873beb7-5857-4685-be1f-d57550cc96cc" xsi:nil="true"/>
+    <TPLaunchHelpLink xmlns="4873beb7-5857-4685-be1f-d57550cc96cc" xsi:nil="true"/>
+    <LocComments xmlns="4873beb7-5857-4685-be1f-d57550cc96cc" xsi:nil="true"/>
+    <LocRecommendedHandoff xmlns="4873beb7-5857-4685-be1f-d57550cc96cc" xsi:nil="true"/>
+    <SourceTitle xmlns="4873beb7-5857-4685-be1f-d57550cc96cc" xsi:nil="true"/>
+    <CSXUpdate xmlns="4873beb7-5857-4685-be1f-d57550cc96cc">false</CSXUpdate>
+    <IntlLocPriority xmlns="4873beb7-5857-4685-be1f-d57550cc96cc" xsi:nil="true"/>
+    <UAProjectedTotalWords xmlns="4873beb7-5857-4685-be1f-d57550cc96cc" xsi:nil="true"/>
+    <AssetType xmlns="4873beb7-5857-4685-be1f-d57550cc96cc">TP</AssetType>
+    <MachineTranslated xmlns="4873beb7-5857-4685-be1f-d57550cc96cc">false</MachineTranslated>
+    <OutputCachingOn xmlns="4873beb7-5857-4685-be1f-d57550cc96cc">false</OutputCachingOn>
+    <TemplateStatus xmlns="4873beb7-5857-4685-be1f-d57550cc96cc">Complete</TemplateStatus>
+    <IsSearchable xmlns="4873beb7-5857-4685-be1f-d57550cc96cc">true</IsSearchable>
+    <ContentItem xmlns="4873beb7-5857-4685-be1f-d57550cc96cc" xsi:nil="true"/>
+    <HandoffToMSDN xmlns="4873beb7-5857-4685-be1f-d57550cc96cc" xsi:nil="true"/>
+    <ShowIn xmlns="4873beb7-5857-4685-be1f-d57550cc96cc">Show everywhere</ShowIn>
+    <ThumbnailAssetId xmlns="4873beb7-5857-4685-be1f-d57550cc96cc" xsi:nil="true"/>
+    <UALocComments xmlns="4873beb7-5857-4685-be1f-d57550cc96cc" xsi:nil="true"/>
+    <UALocRecommendation xmlns="4873beb7-5857-4685-be1f-d57550cc96cc">Localize</UALocRecommendation>
+    <LastModifiedDateTime xmlns="4873beb7-5857-4685-be1f-d57550cc96cc" xsi:nil="true"/>
+    <LegacyData xmlns="4873beb7-5857-4685-be1f-d57550cc96cc" xsi:nil="true"/>
+    <LocManualTestRequired xmlns="4873beb7-5857-4685-be1f-d57550cc96cc">false</LocManualTestRequired>
+    <LocMarketGroupTiers2 xmlns="4873beb7-5857-4685-be1f-d57550cc96cc" xsi:nil="true"/>
+    <ClipArtFilename xmlns="4873beb7-5857-4685-be1f-d57550cc96cc" xsi:nil="true"/>
+    <TPApplication xmlns="4873beb7-5857-4685-be1f-d57550cc96cc" xsi:nil="true"/>
+    <CSXHash xmlns="4873beb7-5857-4685-be1f-d57550cc96cc" xsi:nil="true"/>
+    <DirectSourceMarket xmlns="4873beb7-5857-4685-be1f-d57550cc96cc" xsi:nil="true"/>
+    <PrimaryImageGen xmlns="4873beb7-5857-4685-be1f-d57550cc96cc">true</PrimaryImageGen>
+    <PlannedPubDate xmlns="4873beb7-5857-4685-be1f-d57550cc96cc" xsi:nil="true"/>
+    <CSXSubmissionMarket xmlns="4873beb7-5857-4685-be1f-d57550cc96cc" xsi:nil="true"/>
+    <Downloads xmlns="4873beb7-5857-4685-be1f-d57550cc96cc">0</Downloads>
+    <ArtSampleDocs xmlns="4873beb7-5857-4685-be1f-d57550cc96cc" xsi:nil="true"/>
+    <TrustLevel xmlns="4873beb7-5857-4685-be1f-d57550cc96cc">1 Microsoft Managed Content</TrustLevel>
+    <BlockPublish xmlns="4873beb7-5857-4685-be1f-d57550cc96cc">false</BlockPublish>
+    <TPLaunchHelpLinkType xmlns="4873beb7-5857-4685-be1f-d57550cc96cc">Template</TPLaunchHelpLinkType>
+    <LocalizationTagsTaxHTField0 xmlns="4873beb7-5857-4685-be1f-d57550cc96cc">
+      <Terms xmlns="http://schemas.microsoft.com/office/infopath/2007/PartnerControls"/>
+    </LocalizationTagsTaxHTField0>
+    <BusinessGroup xmlns="4873beb7-5857-4685-be1f-d57550cc96cc" xsi:nil="true"/>
+    <Providers xmlns="4873beb7-5857-4685-be1f-d57550cc96cc" xsi:nil="true"/>
+    <TemplateTemplateType xmlns="4873beb7-5857-4685-be1f-d57550cc96cc">PowerPoint Presentation Template</TemplateTemplateType>
+    <TimesCloned xmlns="4873beb7-5857-4685-be1f-d57550cc96cc" xsi:nil="true"/>
+    <TPAppVersion xmlns="4873beb7-5857-4685-be1f-d57550cc96cc" xsi:nil="true"/>
+    <VoteCount xmlns="4873beb7-5857-4685-be1f-d57550cc96cc" xsi:nil="true"/>
+    <AverageRating xmlns="4873beb7-5857-4685-be1f-d57550cc96cc" xsi:nil="true"/>
+    <FeatureTagsTaxHTField0 xmlns="4873beb7-5857-4685-be1f-d57550cc96cc">
+      <Terms xmlns="http://schemas.microsoft.com/office/infopath/2007/PartnerControls"/>
+    </FeatureTagsTaxHTField0>
+    <Provider xmlns="4873beb7-5857-4685-be1f-d57550cc96cc" xsi:nil="true"/>
+    <UACurrentWords xmlns="4873beb7-5857-4685-be1f-d57550cc96cc" xsi:nil="true"/>
+    <AssetId xmlns="4873beb7-5857-4685-be1f-d57550cc96cc">TP103431361</AssetId>
+    <TPClientViewer xmlns="4873beb7-5857-4685-be1f-d57550cc96cc" xsi:nil="true"/>
+    <DSATActionTaken xmlns="4873beb7-5857-4685-be1f-d57550cc96cc" xsi:nil="true"/>
+    <APEditor xmlns="4873beb7-5857-4685-be1f-d57550cc96cc">
+      <UserInfo>
+        <DisplayName/>
+        <AccountId xsi:nil="true"/>
+        <AccountType/>
+      </UserInfo>
+    </APEditor>
+    <TPInstallLocation xmlns="4873beb7-5857-4685-be1f-d57550cc96cc" xsi:nil="true"/>
+    <OOCacheId xmlns="4873beb7-5857-4685-be1f-d57550cc96cc" xsi:nil="true"/>
+    <IsDeleted xmlns="4873beb7-5857-4685-be1f-d57550cc96cc">false</IsDeleted>
+    <PublishTargets xmlns="4873beb7-5857-4685-be1f-d57550cc96cc">OfficeOnlineVNext</PublishTargets>
+    <ApprovalLog xmlns="4873beb7-5857-4685-be1f-d57550cc96cc" xsi:nil="true"/>
+    <BugNumber xmlns="4873beb7-5857-4685-be1f-d57550cc96cc" xsi:nil="true"/>
+    <CrawlForDependencies xmlns="4873beb7-5857-4685-be1f-d57550cc96cc">false</CrawlForDependencies>
+    <InternalTagsTaxHTField0 xmlns="4873beb7-5857-4685-be1f-d57550cc96cc">
+      <Terms xmlns="http://schemas.microsoft.com/office/infopath/2007/PartnerControls"/>
+    </InternalTagsTaxHTField0>
+    <LastHandOff xmlns="4873beb7-5857-4685-be1f-d57550cc96cc" xsi:nil="true"/>
+    <Milestone xmlns="4873beb7-5857-4685-be1f-d57550cc96cc" xsi:nil="true"/>
+    <OriginalRelease xmlns="4873beb7-5857-4685-be1f-d57550cc96cc">15</OriginalRelease>
+    <RecommendationsModifier xmlns="4873beb7-5857-4685-be1f-d57550cc96cc" xsi:nil="true"/>
+    <ScenarioTagsTaxHTField0 xmlns="4873beb7-5857-4685-be1f-d57550cc96cc">
+      <Terms xmlns="http://schemas.microsoft.com/office/infopath/2007/PartnerControls"/>
+    </ScenarioTagsTaxHTField0>
+    <UANotes xmlns="4873beb7-5857-4685-be1f-d57550cc96cc" xsi:nil="true"/>
+  </documentManagement>
+</p:properties>
+</file>
+
+<file path=customXml/item3.xml><?xml version="1.0" encoding="utf-8"?>
 <ct:contentTypeSchema xmlns:ct="http://schemas.microsoft.com/office/2006/metadata/contentType" xmlns:ma="http://schemas.microsoft.com/office/2006/metadata/properties/metaAttributes" ct:_="" ma:_="" ma:contentTypeName="TemplateFile" ma:contentTypeID="0x0101006EDDDB5EE6D98C44930B742096920B300400F5B6D36B3EF94B4E9A635CDF2A18F5B8" ma:contentTypeVersion="72" ma:contentTypeDescription="Create a new document." ma:contentTypeScope="" ma:versionID="a23e56308344d904b51738559c3d67c9">
   <xsd:schema xmlns:xsd="http://www.w3.org/2001/XMLSchema" xmlns:xs="http://www.w3.org/2001/XMLSchema" xmlns:p="http://schemas.microsoft.com/office/2006/metadata/properties" xmlns:ns2="4873beb7-5857-4685-be1f-d57550cc96cc" targetNamespace="http://schemas.microsoft.com/office/2006/metadata/properties" ma:root="true" ma:fieldsID="cd0908cc4600e77bf5da051303e00c8d" ns2:_="">
     <xsd:import namespace="4873beb7-5857-4685-be1f-d57550cc96cc"/>
@@ -14168,142 +15181,31 @@
 </ct:contentTypeSchema>
 </file>
 
-<file path=customXml/item2.xml><?xml version="1.0" encoding="utf-8"?>
-<?mso-contentType ?>
-<FormTemplates xmlns="http://schemas.microsoft.com/sharepoint/v3/contenttype/forms">
-  <Display>DocumentLibraryForm</Display>
-  <Edit>AssetEditForm</Edit>
-  <New>DocumentLibraryForm</New>
-</FormTemplates>
+<file path=customXml/itemProps1.xml><?xml version="1.0" encoding="utf-8"?>
+<ds:datastoreItem xmlns:ds="http://schemas.openxmlformats.org/officeDocument/2006/customXml" ds:itemID="{561E720F-F05D-4536-9C34-0CFCED65D3B7}">
+  <ds:schemaRefs>
+    <ds:schemaRef ds:uri="http://schemas.microsoft.com/sharepoint/v3/contenttype/forms"/>
+  </ds:schemaRefs>
+</ds:datastoreItem>
 </file>
 
-<file path=customXml/item3.xml><?xml version="1.0" encoding="utf-8"?>
-<p:properties xmlns:p="http://schemas.microsoft.com/office/2006/metadata/properties" xmlns:xsi="http://www.w3.org/2001/XMLSchema-instance" xmlns:pc="http://schemas.microsoft.com/office/infopath/2007/PartnerControls">
-  <documentManagement>
-    <APDescription xmlns="4873beb7-5857-4685-be1f-d57550cc96cc" xsi:nil="true"/>
-    <AssetExpire xmlns="4873beb7-5857-4685-be1f-d57550cc96cc">2029-01-01T08:00:00+00:00</AssetExpire>
-    <CampaignTagsTaxHTField0 xmlns="4873beb7-5857-4685-be1f-d57550cc96cc">
-      <Terms xmlns="http://schemas.microsoft.com/office/infopath/2007/PartnerControls"/>
-    </CampaignTagsTaxHTField0>
-    <IntlLangReviewDate xmlns="4873beb7-5857-4685-be1f-d57550cc96cc" xsi:nil="true"/>
-    <TPFriendlyName xmlns="4873beb7-5857-4685-be1f-d57550cc96cc" xsi:nil="true"/>
-    <IntlLangReview xmlns="4873beb7-5857-4685-be1f-d57550cc96cc">false</IntlLangReview>
-    <LocLastLocAttemptVersionLookup xmlns="4873beb7-5857-4685-be1f-d57550cc96cc">855024</LocLastLocAttemptVersionLookup>
-    <PolicheckWords xmlns="4873beb7-5857-4685-be1f-d57550cc96cc" xsi:nil="true"/>
-    <SubmitterId xmlns="4873beb7-5857-4685-be1f-d57550cc96cc" xsi:nil="true"/>
-    <AcquiredFrom xmlns="4873beb7-5857-4685-be1f-d57550cc96cc">Internal MS</AcquiredFrom>
-    <EditorialStatus xmlns="4873beb7-5857-4685-be1f-d57550cc96cc">Complete</EditorialStatus>
-    <Markets xmlns="4873beb7-5857-4685-be1f-d57550cc96cc"/>
-    <OriginAsset xmlns="4873beb7-5857-4685-be1f-d57550cc96cc" xsi:nil="true"/>
-    <AssetStart xmlns="4873beb7-5857-4685-be1f-d57550cc96cc">2012-08-31T08:50:00+00:00</AssetStart>
-    <FriendlyTitle xmlns="4873beb7-5857-4685-be1f-d57550cc96cc" xsi:nil="true"/>
-    <MarketSpecific xmlns="4873beb7-5857-4685-be1f-d57550cc96cc">false</MarketSpecific>
-    <TPNamespace xmlns="4873beb7-5857-4685-be1f-d57550cc96cc" xsi:nil="true"/>
-    <PublishStatusLookup xmlns="4873beb7-5857-4685-be1f-d57550cc96cc">
-      <Value>1616423</Value>
-    </PublishStatusLookup>
-    <APAuthor xmlns="4873beb7-5857-4685-be1f-d57550cc96cc">
-      <UserInfo>
-        <DisplayName>REDMOND\kristaa</DisplayName>
-        <AccountId>136</AccountId>
-        <AccountType/>
-      </UserInfo>
-    </APAuthor>
-    <TPCommandLine xmlns="4873beb7-5857-4685-be1f-d57550cc96cc" xsi:nil="true"/>
-    <IntlLangReviewer xmlns="4873beb7-5857-4685-be1f-d57550cc96cc" xsi:nil="true"/>
-    <OpenTemplate xmlns="4873beb7-5857-4685-be1f-d57550cc96cc">true</OpenTemplate>
-    <CSXSubmissionDate xmlns="4873beb7-5857-4685-be1f-d57550cc96cc" xsi:nil="true"/>
-    <TaxCatchAll xmlns="4873beb7-5857-4685-be1f-d57550cc96cc"/>
-    <Manager xmlns="4873beb7-5857-4685-be1f-d57550cc96cc" xsi:nil="true"/>
-    <NumericId xmlns="4873beb7-5857-4685-be1f-d57550cc96cc" xsi:nil="true"/>
-    <ParentAssetId xmlns="4873beb7-5857-4685-be1f-d57550cc96cc" xsi:nil="true"/>
-    <OriginalSourceMarket xmlns="4873beb7-5857-4685-be1f-d57550cc96cc" xsi:nil="true"/>
-    <ApprovalStatus xmlns="4873beb7-5857-4685-be1f-d57550cc96cc">InProgress</ApprovalStatus>
-    <TPComponent xmlns="4873beb7-5857-4685-be1f-d57550cc96cc" xsi:nil="true"/>
-    <EditorialTags xmlns="4873beb7-5857-4685-be1f-d57550cc96cc" xsi:nil="true"/>
-    <TPExecutable xmlns="4873beb7-5857-4685-be1f-d57550cc96cc" xsi:nil="true"/>
-    <TPLaunchHelpLink xmlns="4873beb7-5857-4685-be1f-d57550cc96cc" xsi:nil="true"/>
-    <LocComments xmlns="4873beb7-5857-4685-be1f-d57550cc96cc" xsi:nil="true"/>
-    <LocRecommendedHandoff xmlns="4873beb7-5857-4685-be1f-d57550cc96cc" xsi:nil="true"/>
-    <SourceTitle xmlns="4873beb7-5857-4685-be1f-d57550cc96cc" xsi:nil="true"/>
-    <CSXUpdate xmlns="4873beb7-5857-4685-be1f-d57550cc96cc">false</CSXUpdate>
-    <IntlLocPriority xmlns="4873beb7-5857-4685-be1f-d57550cc96cc" xsi:nil="true"/>
-    <UAProjectedTotalWords xmlns="4873beb7-5857-4685-be1f-d57550cc96cc" xsi:nil="true"/>
-    <AssetType xmlns="4873beb7-5857-4685-be1f-d57550cc96cc">TP</AssetType>
-    <MachineTranslated xmlns="4873beb7-5857-4685-be1f-d57550cc96cc">false</MachineTranslated>
-    <OutputCachingOn xmlns="4873beb7-5857-4685-be1f-d57550cc96cc">false</OutputCachingOn>
-    <TemplateStatus xmlns="4873beb7-5857-4685-be1f-d57550cc96cc">Complete</TemplateStatus>
-    <IsSearchable xmlns="4873beb7-5857-4685-be1f-d57550cc96cc">true</IsSearchable>
-    <ContentItem xmlns="4873beb7-5857-4685-be1f-d57550cc96cc" xsi:nil="true"/>
-    <HandoffToMSDN xmlns="4873beb7-5857-4685-be1f-d57550cc96cc" xsi:nil="true"/>
-    <ShowIn xmlns="4873beb7-5857-4685-be1f-d57550cc96cc">Show everywhere</ShowIn>
-    <ThumbnailAssetId xmlns="4873beb7-5857-4685-be1f-d57550cc96cc" xsi:nil="true"/>
-    <UALocComments xmlns="4873beb7-5857-4685-be1f-d57550cc96cc" xsi:nil="true"/>
-    <UALocRecommendation xmlns="4873beb7-5857-4685-be1f-d57550cc96cc">Localize</UALocRecommendation>
-    <LastModifiedDateTime xmlns="4873beb7-5857-4685-be1f-d57550cc96cc" xsi:nil="true"/>
-    <LegacyData xmlns="4873beb7-5857-4685-be1f-d57550cc96cc" xsi:nil="true"/>
-    <LocManualTestRequired xmlns="4873beb7-5857-4685-be1f-d57550cc96cc">false</LocManualTestRequired>
-    <LocMarketGroupTiers2 xmlns="4873beb7-5857-4685-be1f-d57550cc96cc" xsi:nil="true"/>
-    <ClipArtFilename xmlns="4873beb7-5857-4685-be1f-d57550cc96cc" xsi:nil="true"/>
-    <TPApplication xmlns="4873beb7-5857-4685-be1f-d57550cc96cc" xsi:nil="true"/>
-    <CSXHash xmlns="4873beb7-5857-4685-be1f-d57550cc96cc" xsi:nil="true"/>
-    <DirectSourceMarket xmlns="4873beb7-5857-4685-be1f-d57550cc96cc" xsi:nil="true"/>
-    <PrimaryImageGen xmlns="4873beb7-5857-4685-be1f-d57550cc96cc">true</PrimaryImageGen>
-    <PlannedPubDate xmlns="4873beb7-5857-4685-be1f-d57550cc96cc" xsi:nil="true"/>
-    <CSXSubmissionMarket xmlns="4873beb7-5857-4685-be1f-d57550cc96cc" xsi:nil="true"/>
-    <Downloads xmlns="4873beb7-5857-4685-be1f-d57550cc96cc">0</Downloads>
-    <ArtSampleDocs xmlns="4873beb7-5857-4685-be1f-d57550cc96cc" xsi:nil="true"/>
-    <TrustLevel xmlns="4873beb7-5857-4685-be1f-d57550cc96cc">1 Microsoft Managed Content</TrustLevel>
-    <BlockPublish xmlns="4873beb7-5857-4685-be1f-d57550cc96cc">false</BlockPublish>
-    <TPLaunchHelpLinkType xmlns="4873beb7-5857-4685-be1f-d57550cc96cc">Template</TPLaunchHelpLinkType>
-    <LocalizationTagsTaxHTField0 xmlns="4873beb7-5857-4685-be1f-d57550cc96cc">
-      <Terms xmlns="http://schemas.microsoft.com/office/infopath/2007/PartnerControls"/>
-    </LocalizationTagsTaxHTField0>
-    <BusinessGroup xmlns="4873beb7-5857-4685-be1f-d57550cc96cc" xsi:nil="true"/>
-    <Providers xmlns="4873beb7-5857-4685-be1f-d57550cc96cc" xsi:nil="true"/>
-    <TemplateTemplateType xmlns="4873beb7-5857-4685-be1f-d57550cc96cc">PowerPoint Presentation Template</TemplateTemplateType>
-    <TimesCloned xmlns="4873beb7-5857-4685-be1f-d57550cc96cc" xsi:nil="true"/>
-    <TPAppVersion xmlns="4873beb7-5857-4685-be1f-d57550cc96cc" xsi:nil="true"/>
-    <VoteCount xmlns="4873beb7-5857-4685-be1f-d57550cc96cc" xsi:nil="true"/>
-    <AverageRating xmlns="4873beb7-5857-4685-be1f-d57550cc96cc" xsi:nil="true"/>
-    <FeatureTagsTaxHTField0 xmlns="4873beb7-5857-4685-be1f-d57550cc96cc">
-      <Terms xmlns="http://schemas.microsoft.com/office/infopath/2007/PartnerControls"/>
-    </FeatureTagsTaxHTField0>
-    <Provider xmlns="4873beb7-5857-4685-be1f-d57550cc96cc" xsi:nil="true"/>
-    <UACurrentWords xmlns="4873beb7-5857-4685-be1f-d57550cc96cc" xsi:nil="true"/>
-    <AssetId xmlns="4873beb7-5857-4685-be1f-d57550cc96cc">TP103431361</AssetId>
-    <TPClientViewer xmlns="4873beb7-5857-4685-be1f-d57550cc96cc" xsi:nil="true"/>
-    <DSATActionTaken xmlns="4873beb7-5857-4685-be1f-d57550cc96cc" xsi:nil="true"/>
-    <APEditor xmlns="4873beb7-5857-4685-be1f-d57550cc96cc">
-      <UserInfo>
-        <DisplayName/>
-        <AccountId xsi:nil="true"/>
-        <AccountType/>
-      </UserInfo>
-    </APEditor>
-    <TPInstallLocation xmlns="4873beb7-5857-4685-be1f-d57550cc96cc" xsi:nil="true"/>
-    <OOCacheId xmlns="4873beb7-5857-4685-be1f-d57550cc96cc" xsi:nil="true"/>
-    <IsDeleted xmlns="4873beb7-5857-4685-be1f-d57550cc96cc">false</IsDeleted>
-    <PublishTargets xmlns="4873beb7-5857-4685-be1f-d57550cc96cc">OfficeOnlineVNext</PublishTargets>
-    <ApprovalLog xmlns="4873beb7-5857-4685-be1f-d57550cc96cc" xsi:nil="true"/>
-    <BugNumber xmlns="4873beb7-5857-4685-be1f-d57550cc96cc" xsi:nil="true"/>
-    <CrawlForDependencies xmlns="4873beb7-5857-4685-be1f-d57550cc96cc">false</CrawlForDependencies>
-    <InternalTagsTaxHTField0 xmlns="4873beb7-5857-4685-be1f-d57550cc96cc">
-      <Terms xmlns="http://schemas.microsoft.com/office/infopath/2007/PartnerControls"/>
-    </InternalTagsTaxHTField0>
-    <LastHandOff xmlns="4873beb7-5857-4685-be1f-d57550cc96cc" xsi:nil="true"/>
-    <Milestone xmlns="4873beb7-5857-4685-be1f-d57550cc96cc" xsi:nil="true"/>
-    <OriginalRelease xmlns="4873beb7-5857-4685-be1f-d57550cc96cc">15</OriginalRelease>
-    <RecommendationsModifier xmlns="4873beb7-5857-4685-be1f-d57550cc96cc" xsi:nil="true"/>
-    <ScenarioTagsTaxHTField0 xmlns="4873beb7-5857-4685-be1f-d57550cc96cc">
-      <Terms xmlns="http://schemas.microsoft.com/office/infopath/2007/PartnerControls"/>
-    </ScenarioTagsTaxHTField0>
-    <UANotes xmlns="4873beb7-5857-4685-be1f-d57550cc96cc" xsi:nil="true"/>
-  </documentManagement>
-</p:properties>
+<file path=customXml/itemProps2.xml><?xml version="1.0" encoding="utf-8"?>
+<ds:datastoreItem xmlns:ds="http://schemas.openxmlformats.org/officeDocument/2006/customXml" ds:itemID="{8CDDBB83-77C1-4099-A0AA-289882E745E2}">
+  <ds:schemaRefs>
+    <ds:schemaRef ds:uri="http://purl.org/dc/terms/"/>
+    <ds:schemaRef ds:uri="http://purl.org/dc/dcmitype/"/>
+    <ds:schemaRef ds:uri="http://www.w3.org/XML/1998/namespace"/>
+    <ds:schemaRef ds:uri="http://purl.org/dc/elements/1.1/"/>
+    <ds:schemaRef ds:uri="http://schemas.microsoft.com/office/infopath/2007/PartnerControls"/>
+    <ds:schemaRef ds:uri="http://schemas.microsoft.com/office/2006/documentManagement/types"/>
+    <ds:schemaRef ds:uri="http://schemas.openxmlformats.org/package/2006/metadata/core-properties"/>
+    <ds:schemaRef ds:uri="4873beb7-5857-4685-be1f-d57550cc96cc"/>
+    <ds:schemaRef ds:uri="http://schemas.microsoft.com/office/2006/metadata/properties"/>
+  </ds:schemaRefs>
+</ds:datastoreItem>
 </file>
 
-<file path=customXml/itemProps1.xml><?xml version="1.0" encoding="utf-8"?>
+<file path=customXml/itemProps3.xml><?xml version="1.0" encoding="utf-8"?>
 <ds:datastoreItem xmlns:ds="http://schemas.openxmlformats.org/officeDocument/2006/customXml" ds:itemID="{28C8B9CA-0273-4370-889A-FC05DA5C2FA5}">
   <ds:schemaRefs>
     <ds:schemaRef ds:uri="http://schemas.microsoft.com/office/2006/metadata/contentType"/>
@@ -14319,28 +15221,4 @@
     <ds:schemaRef ds:uri="http://schemas.microsoft.com/internal/obd"/>
   </ds:schemaRefs>
 </ds:datastoreItem>
-</file>
-
-<file path=customXml/itemProps2.xml><?xml version="1.0" encoding="utf-8"?>
-<ds:datastoreItem xmlns:ds="http://schemas.openxmlformats.org/officeDocument/2006/customXml" ds:itemID="{561E720F-F05D-4536-9C34-0CFCED65D3B7}">
-  <ds:schemaRefs>
-    <ds:schemaRef ds:uri="http://schemas.microsoft.com/sharepoint/v3/contenttype/forms"/>
-  </ds:schemaRefs>
-</ds:datastoreItem>
-</file>
-
-<file path=customXml/itemProps3.xml><?xml version="1.0" encoding="utf-8"?>
-<ds:datastoreItem xmlns:ds="http://schemas.openxmlformats.org/officeDocument/2006/customXml" ds:itemID="{8CDDBB83-77C1-4099-A0AA-289882E745E2}">
-  <ds:schemaRefs>
-    <ds:schemaRef ds:uri="http://purl.org/dc/terms/"/>
-    <ds:schemaRef ds:uri="http://purl.org/dc/dcmitype/"/>
-    <ds:schemaRef ds:uri="http://www.w3.org/XML/1998/namespace"/>
-    <ds:schemaRef ds:uri="http://purl.org/dc/elements/1.1/"/>
-    <ds:schemaRef ds:uri="http://schemas.microsoft.com/office/infopath/2007/PartnerControls"/>
-    <ds:schemaRef ds:uri="http://schemas.microsoft.com/office/2006/documentManagement/types"/>
-    <ds:schemaRef ds:uri="http://schemas.openxmlformats.org/package/2006/metadata/core-properties"/>
-    <ds:schemaRef ds:uri="4873beb7-5857-4685-be1f-d57550cc96cc"/>
-    <ds:schemaRef ds:uri="http://schemas.microsoft.com/office/2006/metadata/properties"/>
-  </ds:schemaRefs>
-</ds:datastoreItem>
 </file>
</xml_diff>